<commit_message>
#1647 Drastic reconsiderations of SpringSecurity structure
(cherry picked from commit 77a486746e03e18da95658cc8b1ccccb517432a5)
</commit_message>
<xml_diff>
--- a/source_en/Overview/images_FrameworkStack/materialFrameworkStack.pptx
+++ b/source_en/Overview/images_FrameworkStack/materialFrameworkStack.pptx
@@ -5,11 +5,12 @@
     <p:sldMasterId id="2147483648" r:id="rId1"/>
   </p:sldMasterIdLst>
   <p:notesMasterIdLst>
-    <p:notesMasterId r:id="rId4"/>
+    <p:notesMasterId r:id="rId5"/>
   </p:notesMasterIdLst>
   <p:sldIdLst>
     <p:sldId id="272" r:id="rId2"/>
     <p:sldId id="337" r:id="rId3"/>
+    <p:sldId id="338" r:id="rId4"/>
   </p:sldIdLst>
   <p:sldSz cx="9144000" cy="6858000" type="screen4x3"/>
   <p:notesSz cx="6858000" cy="9144000"/>
@@ -115,9 +116,24 @@
           <p14:sldIdLst>
             <p14:sldId id="272"/>
             <p14:sldId id="337"/>
+            <p14:sldId id="338"/>
           </p14:sldIdLst>
         </p14:section>
       </p14:sectionLst>
+    </p:ext>
+    <p:ext uri="{EFAFB233-063F-42B5-8137-9DF3F51BA10A}">
+      <p15:sldGuideLst xmlns:p15="http://schemas.microsoft.com/office/powerpoint/2012/main">
+        <p15:guide id="1" orient="horz" pos="2160">
+          <p15:clr>
+            <a:srgbClr val="A4A3A4"/>
+          </p15:clr>
+        </p15:guide>
+        <p15:guide id="2" pos="2880">
+          <p15:clr>
+            <a:srgbClr val="A4A3A4"/>
+          </p15:clr>
+        </p15:guide>
+      </p15:sldGuideLst>
     </p:ext>
   </p:extLst>
 </p:presentation>
@@ -205,7 +221,7 @@
           <a:p>
             <a:fld id="{3BB47352-BF5A-4CD2-B029-996118CD8E01}" type="datetimeFigureOut">
               <a:rPr kumimoji="1" lang="ja-JP" altLang="en-US" smtClean="0"/>
-              <a:t>2015/2/12</a:t>
+              <a:t>2016/2/5</a:t>
             </a:fld>
             <a:endParaRPr kumimoji="1" lang="ja-JP" altLang="en-US"/>
           </a:p>
@@ -673,6 +689,90 @@
 </p:notes>
 </file>
 
+<file path=ppt/notesSlides/notesSlide3.xml><?xml version="1.0" encoding="utf-8"?>
+<p:notes xmlns:a="http://schemas.openxmlformats.org/drawingml/2006/main" xmlns:r="http://schemas.openxmlformats.org/officeDocument/2006/relationships" xmlns:p="http://schemas.openxmlformats.org/presentationml/2006/main">
+  <p:cSld>
+    <p:spTree>
+      <p:nvGrpSpPr>
+        <p:cNvPr id="1" name=""/>
+        <p:cNvGrpSpPr/>
+        <p:nvPr/>
+      </p:nvGrpSpPr>
+      <p:grpSpPr>
+        <a:xfrm>
+          <a:off x="0" y="0"/>
+          <a:ext cx="0" cy="0"/>
+          <a:chOff x="0" y="0"/>
+          <a:chExt cx="0" cy="0"/>
+        </a:xfrm>
+      </p:grpSpPr>
+      <p:sp>
+        <p:nvSpPr>
+          <p:cNvPr id="2" name="スライド イメージ プレースホルダー 1"/>
+          <p:cNvSpPr>
+            <a:spLocks noGrp="1" noRot="1" noChangeAspect="1"/>
+          </p:cNvSpPr>
+          <p:nvPr>
+            <p:ph type="sldImg"/>
+          </p:nvPr>
+        </p:nvSpPr>
+        <p:spPr/>
+      </p:sp>
+      <p:sp>
+        <p:nvSpPr>
+          <p:cNvPr id="3" name="ノート プレースホルダー 2"/>
+          <p:cNvSpPr>
+            <a:spLocks noGrp="1"/>
+          </p:cNvSpPr>
+          <p:nvPr>
+            <p:ph type="body" idx="1"/>
+          </p:nvPr>
+        </p:nvSpPr>
+        <p:spPr/>
+        <p:txBody>
+          <a:bodyPr/>
+          <a:lstStyle/>
+          <a:p>
+            <a:endParaRPr kumimoji="1" lang="ja-JP" altLang="en-US" dirty="0"/>
+          </a:p>
+        </p:txBody>
+      </p:sp>
+      <p:sp>
+        <p:nvSpPr>
+          <p:cNvPr id="4" name="スライド番号プレースホルダー 3"/>
+          <p:cNvSpPr>
+            <a:spLocks noGrp="1"/>
+          </p:cNvSpPr>
+          <p:nvPr>
+            <p:ph type="sldNum" sz="quarter" idx="10"/>
+          </p:nvPr>
+        </p:nvSpPr>
+        <p:spPr/>
+        <p:txBody>
+          <a:bodyPr/>
+          <a:lstStyle/>
+          <a:p>
+            <a:fld id="{003CFFA3-9D07-4088-826B-DF328166082C}" type="slidenum">
+              <a:rPr kumimoji="1" lang="ja-JP" altLang="en-US" smtClean="0"/>
+              <a:t>3</a:t>
+            </a:fld>
+            <a:endParaRPr kumimoji="1" lang="ja-JP" altLang="en-US"/>
+          </a:p>
+        </p:txBody>
+      </p:sp>
+    </p:spTree>
+    <p:extLst>
+      <p:ext uri="{BB962C8B-B14F-4D97-AF65-F5344CB8AC3E}">
+        <p14:creationId xmlns:p14="http://schemas.microsoft.com/office/powerpoint/2010/main" val="1282525066"/>
+      </p:ext>
+    </p:extLst>
+  </p:cSld>
+  <p:clrMapOvr>
+    <a:masterClrMapping/>
+  </p:clrMapOvr>
+</p:notes>
+</file>
+
 <file path=ppt/slideLayouts/slideLayout1.xml><?xml version="1.0" encoding="utf-8"?>
 <p:sldLayout xmlns:a="http://schemas.openxmlformats.org/drawingml/2006/main" xmlns:r="http://schemas.openxmlformats.org/officeDocument/2006/relationships" xmlns:p="http://schemas.openxmlformats.org/presentationml/2006/main" type="title" preserve="1">
   <p:cSld name="タイトル スライド">
@@ -854,7 +954,7 @@
           <a:p>
             <a:fld id="{7B9B12EC-6AA0-374B-A2D3-850081A07A26}" type="datetimeFigureOut">
               <a:rPr kumimoji="1" lang="ja-JP" altLang="en-US" smtClean="0"/>
-              <a:t>2015/2/12</a:t>
+              <a:t>2016/2/5</a:t>
             </a:fld>
             <a:endParaRPr kumimoji="1" lang="ja-JP" altLang="en-US"/>
           </a:p>
@@ -1056,7 +1156,7 @@
           <a:p>
             <a:fld id="{7B9B12EC-6AA0-374B-A2D3-850081A07A26}" type="datetimeFigureOut">
               <a:rPr kumimoji="1" lang="ja-JP" altLang="en-US" smtClean="0"/>
-              <a:t>2015/2/12</a:t>
+              <a:t>2016/2/5</a:t>
             </a:fld>
             <a:endParaRPr kumimoji="1" lang="ja-JP" altLang="en-US"/>
           </a:p>
@@ -1268,7 +1368,7 @@
           <a:p>
             <a:fld id="{7B9B12EC-6AA0-374B-A2D3-850081A07A26}" type="datetimeFigureOut">
               <a:rPr kumimoji="1" lang="ja-JP" altLang="en-US" smtClean="0"/>
-              <a:t>2015/2/12</a:t>
+              <a:t>2016/2/5</a:t>
             </a:fld>
             <a:endParaRPr kumimoji="1" lang="ja-JP" altLang="en-US"/>
           </a:p>
@@ -1470,7 +1570,7 @@
           <a:p>
             <a:fld id="{7B9B12EC-6AA0-374B-A2D3-850081A07A26}" type="datetimeFigureOut">
               <a:rPr kumimoji="1" lang="ja-JP" altLang="en-US" smtClean="0"/>
-              <a:t>2015/2/12</a:t>
+              <a:t>2016/2/5</a:t>
             </a:fld>
             <a:endParaRPr kumimoji="1" lang="ja-JP" altLang="en-US"/>
           </a:p>
@@ -1716,7 +1816,7 @@
           <a:p>
             <a:fld id="{7B9B12EC-6AA0-374B-A2D3-850081A07A26}" type="datetimeFigureOut">
               <a:rPr kumimoji="1" lang="ja-JP" altLang="en-US" smtClean="0"/>
-              <a:t>2015/2/12</a:t>
+              <a:t>2016/2/5</a:t>
             </a:fld>
             <a:endParaRPr kumimoji="1" lang="ja-JP" altLang="en-US"/>
           </a:p>
@@ -2068,7 +2168,7 @@
           <a:p>
             <a:fld id="{7B9B12EC-6AA0-374B-A2D3-850081A07A26}" type="datetimeFigureOut">
               <a:rPr kumimoji="1" lang="ja-JP" altLang="en-US" smtClean="0"/>
-              <a:t>2015/2/12</a:t>
+              <a:t>2016/2/5</a:t>
             </a:fld>
             <a:endParaRPr kumimoji="1" lang="ja-JP" altLang="en-US"/>
           </a:p>
@@ -2554,7 +2654,7 @@
           <a:p>
             <a:fld id="{7B9B12EC-6AA0-374B-A2D3-850081A07A26}" type="datetimeFigureOut">
               <a:rPr kumimoji="1" lang="ja-JP" altLang="en-US" smtClean="0"/>
-              <a:t>2015/2/12</a:t>
+              <a:t>2016/2/5</a:t>
             </a:fld>
             <a:endParaRPr kumimoji="1" lang="ja-JP" altLang="en-US"/>
           </a:p>
@@ -2672,7 +2772,7 @@
           <a:p>
             <a:fld id="{7B9B12EC-6AA0-374B-A2D3-850081A07A26}" type="datetimeFigureOut">
               <a:rPr kumimoji="1" lang="ja-JP" altLang="en-US" smtClean="0"/>
-              <a:t>2015/2/12</a:t>
+              <a:t>2016/2/5</a:t>
             </a:fld>
             <a:endParaRPr kumimoji="1" lang="ja-JP" altLang="en-US"/>
           </a:p>
@@ -2767,7 +2867,7 @@
           <a:p>
             <a:fld id="{7B9B12EC-6AA0-374B-A2D3-850081A07A26}" type="datetimeFigureOut">
               <a:rPr kumimoji="1" lang="ja-JP" altLang="en-US" smtClean="0"/>
-              <a:t>2015/2/12</a:t>
+              <a:t>2016/2/5</a:t>
             </a:fld>
             <a:endParaRPr kumimoji="1" lang="ja-JP" altLang="en-US"/>
           </a:p>
@@ -3076,7 +3176,7 @@
           <a:p>
             <a:fld id="{7B9B12EC-6AA0-374B-A2D3-850081A07A26}" type="datetimeFigureOut">
               <a:rPr kumimoji="1" lang="ja-JP" altLang="en-US" smtClean="0"/>
-              <a:t>2015/2/12</a:t>
+              <a:t>2016/2/5</a:t>
             </a:fld>
             <a:endParaRPr kumimoji="1" lang="ja-JP" altLang="en-US"/>
           </a:p>
@@ -3329,7 +3429,7 @@
           <a:p>
             <a:fld id="{7B9B12EC-6AA0-374B-A2D3-850081A07A26}" type="datetimeFigureOut">
               <a:rPr kumimoji="1" lang="ja-JP" altLang="en-US" smtClean="0"/>
-              <a:t>2015/2/12</a:t>
+              <a:t>2016/2/5</a:t>
             </a:fld>
             <a:endParaRPr kumimoji="1" lang="ja-JP" altLang="en-US"/>
           </a:p>
@@ -3574,7 +3674,7 @@
           <a:p>
             <a:fld id="{7B9B12EC-6AA0-374B-A2D3-850081A07A26}" type="datetimeFigureOut">
               <a:rPr kumimoji="1" lang="ja-JP" altLang="en-US" smtClean="0"/>
-              <a:t>2015/2/12</a:t>
+              <a:t>2016/2/5</a:t>
             </a:fld>
             <a:endParaRPr kumimoji="1" lang="ja-JP" altLang="en-US"/>
           </a:p>
@@ -4803,7 +4903,7 @@
             </a:r>
             <a:r>
               <a:rPr lang="en-US" altLang="ja-JP" dirty="0" smtClean="0"/>
-              <a:t>Brower</a:t>
+              <a:t>Browser</a:t>
             </a:r>
             <a:endParaRPr lang="en-US" altLang="ja-JP" dirty="0"/>
           </a:p>
@@ -5145,7 +5245,6 @@
               <a:rPr lang="en-US" altLang="ja-JP" dirty="0" smtClean="0"/>
               <a:t>MyBatis3</a:t>
             </a:r>
-            <a:endParaRPr lang="en-US" altLang="ja-JP" dirty="0" smtClean="0"/>
           </a:p>
         </p:txBody>
       </p:sp>
@@ -5729,7 +5828,7 @@
             </a:r>
             <a:r>
               <a:rPr lang="en-US" altLang="ja-JP" dirty="0" smtClean="0"/>
-              <a:t>Brower</a:t>
+              <a:t>Browser</a:t>
             </a:r>
             <a:endParaRPr lang="en-US" altLang="ja-JP" dirty="0"/>
           </a:p>
@@ -6629,6 +6728,2520 @@
     <p:extLst>
       <p:ext uri="{BB962C8B-B14F-4D97-AF65-F5344CB8AC3E}">
         <p14:creationId xmlns:p14="http://schemas.microsoft.com/office/powerpoint/2010/main" val="3110005173"/>
+      </p:ext>
+    </p:extLst>
+  </p:cSld>
+  <p:clrMapOvr>
+    <a:masterClrMapping/>
+  </p:clrMapOvr>
+  <p:timing>
+    <p:tnLst>
+      <p:par>
+        <p:cTn id="1" dur="indefinite" restart="never" nodeType="tmRoot"/>
+      </p:par>
+    </p:tnLst>
+  </p:timing>
+</p:sld>
+</file>
+
+<file path=ppt/slides/slide3.xml><?xml version="1.0" encoding="utf-8"?>
+<p:sld xmlns:a="http://schemas.openxmlformats.org/drawingml/2006/main" xmlns:r="http://schemas.openxmlformats.org/officeDocument/2006/relationships" xmlns:p="http://schemas.openxmlformats.org/presentationml/2006/main">
+  <p:cSld>
+    <p:spTree>
+      <p:nvGrpSpPr>
+        <p:cNvPr id="1" name=""/>
+        <p:cNvGrpSpPr/>
+        <p:nvPr/>
+      </p:nvGrpSpPr>
+      <p:grpSpPr>
+        <a:xfrm>
+          <a:off x="0" y="0"/>
+          <a:ext cx="0" cy="0"/>
+          <a:chOff x="0" y="0"/>
+          <a:chExt cx="0" cy="0"/>
+        </a:xfrm>
+      </p:grpSpPr>
+      <p:sp>
+        <p:nvSpPr>
+          <p:cNvPr id="46" name="角丸四角形 45"/>
+          <p:cNvSpPr/>
+          <p:nvPr/>
+        </p:nvSpPr>
+        <p:spPr>
+          <a:xfrm>
+            <a:off x="3114778" y="4425030"/>
+            <a:ext cx="3387338" cy="368242"/>
+          </a:xfrm>
+          <a:prstGeom prst="roundRect">
+            <a:avLst/>
+          </a:prstGeom>
+          <a:gradFill>
+            <a:gsLst>
+              <a:gs pos="0">
+                <a:schemeClr val="bg1">
+                  <a:lumMod val="75000"/>
+                </a:schemeClr>
+              </a:gs>
+              <a:gs pos="100000">
+                <a:schemeClr val="bg1">
+                  <a:lumMod val="95000"/>
+                </a:schemeClr>
+              </a:gs>
+            </a:gsLst>
+          </a:gradFill>
+        </p:spPr>
+        <p:style>
+          <a:lnRef idx="1">
+            <a:schemeClr val="dk1"/>
+          </a:lnRef>
+          <a:fillRef idx="3">
+            <a:schemeClr val="dk1"/>
+          </a:fillRef>
+          <a:effectRef idx="2">
+            <a:schemeClr val="dk1"/>
+          </a:effectRef>
+          <a:fontRef idx="minor">
+            <a:schemeClr val="lt1"/>
+          </a:fontRef>
+        </p:style>
+        <p:txBody>
+          <a:bodyPr rtlCol="0" anchor="ctr"/>
+          <a:lstStyle/>
+          <a:p>
+            <a:pPr algn="ctr"/>
+            <a:r>
+              <a:rPr lang="en-US" altLang="ja-JP" sz="1600" dirty="0">
+                <a:solidFill>
+                  <a:schemeClr val="tx1">
+                    <a:lumMod val="75000"/>
+                    <a:lumOff val="25000"/>
+                  </a:schemeClr>
+                </a:solidFill>
+              </a:rPr>
+              <a:t>s</a:t>
+            </a:r>
+            <a:r>
+              <a:rPr lang="en-US" altLang="ja-JP" sz="1600" dirty="0" smtClean="0">
+                <a:solidFill>
+                  <a:schemeClr val="tx1">
+                    <a:lumMod val="75000"/>
+                    <a:lumOff val="25000"/>
+                  </a:schemeClr>
+                </a:solidFill>
+              </a:rPr>
+              <a:t>ecurity-core</a:t>
+            </a:r>
+            <a:endParaRPr kumimoji="1" lang="en-US" altLang="ja-JP" sz="1600" dirty="0" smtClean="0">
+              <a:solidFill>
+                <a:schemeClr val="tx1">
+                  <a:lumMod val="75000"/>
+                  <a:lumOff val="25000"/>
+                </a:schemeClr>
+              </a:solidFill>
+            </a:endParaRPr>
+          </a:p>
+        </p:txBody>
+      </p:sp>
+      <p:sp>
+        <p:nvSpPr>
+          <p:cNvPr id="47" name="角丸四角形 46"/>
+          <p:cNvSpPr/>
+          <p:nvPr/>
+        </p:nvSpPr>
+        <p:spPr>
+          <a:xfrm>
+            <a:off x="3118347" y="3778545"/>
+            <a:ext cx="3363924" cy="368242"/>
+          </a:xfrm>
+          <a:prstGeom prst="roundRect">
+            <a:avLst/>
+          </a:prstGeom>
+          <a:gradFill>
+            <a:gsLst>
+              <a:gs pos="0">
+                <a:schemeClr val="bg1">
+                  <a:lumMod val="75000"/>
+                </a:schemeClr>
+              </a:gs>
+              <a:gs pos="100000">
+                <a:schemeClr val="bg1">
+                  <a:lumMod val="95000"/>
+                </a:schemeClr>
+              </a:gs>
+            </a:gsLst>
+          </a:gradFill>
+        </p:spPr>
+        <p:style>
+          <a:lnRef idx="1">
+            <a:schemeClr val="dk1"/>
+          </a:lnRef>
+          <a:fillRef idx="3">
+            <a:schemeClr val="dk1"/>
+          </a:fillRef>
+          <a:effectRef idx="2">
+            <a:schemeClr val="dk1"/>
+          </a:effectRef>
+          <a:fontRef idx="minor">
+            <a:schemeClr val="lt1"/>
+          </a:fontRef>
+        </p:style>
+        <p:txBody>
+          <a:bodyPr rtlCol="0" anchor="ctr"/>
+          <a:lstStyle/>
+          <a:p>
+            <a:pPr algn="ctr"/>
+            <a:r>
+              <a:rPr lang="en-US" altLang="ja-JP" sz="1600" dirty="0">
+                <a:solidFill>
+                  <a:schemeClr val="tx1">
+                    <a:lumMod val="75000"/>
+                    <a:lumOff val="25000"/>
+                  </a:schemeClr>
+                </a:solidFill>
+              </a:rPr>
+              <a:t>s</a:t>
+            </a:r>
+            <a:r>
+              <a:rPr lang="en-US" altLang="ja-JP" sz="1600" dirty="0" smtClean="0">
+                <a:solidFill>
+                  <a:schemeClr val="tx1">
+                    <a:lumMod val="75000"/>
+                    <a:lumOff val="25000"/>
+                  </a:schemeClr>
+                </a:solidFill>
+              </a:rPr>
+              <a:t>ecurity-web</a:t>
+            </a:r>
+            <a:endParaRPr kumimoji="1" lang="en-US" altLang="ja-JP" sz="1600" dirty="0" smtClean="0">
+              <a:solidFill>
+                <a:schemeClr val="tx1">
+                  <a:lumMod val="75000"/>
+                  <a:lumOff val="25000"/>
+                </a:schemeClr>
+              </a:solidFill>
+            </a:endParaRPr>
+          </a:p>
+        </p:txBody>
+      </p:sp>
+      <p:sp>
+        <p:nvSpPr>
+          <p:cNvPr id="48" name="角丸四角形 47"/>
+          <p:cNvSpPr/>
+          <p:nvPr/>
+        </p:nvSpPr>
+        <p:spPr>
+          <a:xfrm>
+            <a:off x="3148113" y="6364485"/>
+            <a:ext cx="3363925" cy="368242"/>
+          </a:xfrm>
+          <a:prstGeom prst="roundRect">
+            <a:avLst/>
+          </a:prstGeom>
+          <a:gradFill>
+            <a:gsLst>
+              <a:gs pos="0">
+                <a:schemeClr val="bg1">
+                  <a:lumMod val="75000"/>
+                </a:schemeClr>
+              </a:gs>
+              <a:gs pos="100000">
+                <a:schemeClr val="bg1">
+                  <a:lumMod val="95000"/>
+                </a:schemeClr>
+              </a:gs>
+            </a:gsLst>
+          </a:gradFill>
+        </p:spPr>
+        <p:style>
+          <a:lnRef idx="1">
+            <a:schemeClr val="dk1"/>
+          </a:lnRef>
+          <a:fillRef idx="3">
+            <a:schemeClr val="dk1"/>
+          </a:fillRef>
+          <a:effectRef idx="2">
+            <a:schemeClr val="dk1"/>
+          </a:effectRef>
+          <a:fontRef idx="minor">
+            <a:schemeClr val="lt1"/>
+          </a:fontRef>
+        </p:style>
+        <p:txBody>
+          <a:bodyPr rtlCol="0" anchor="ctr"/>
+          <a:lstStyle/>
+          <a:p>
+            <a:pPr algn="ctr"/>
+            <a:r>
+              <a:rPr lang="en-US" altLang="ja-JP" sz="1600" dirty="0" smtClean="0">
+                <a:solidFill>
+                  <a:schemeClr val="tx1">
+                    <a:lumMod val="75000"/>
+                    <a:lumOff val="25000"/>
+                  </a:schemeClr>
+                </a:solidFill>
+              </a:rPr>
+              <a:t>recommended</a:t>
+            </a:r>
+            <a:r>
+              <a:rPr lang="en-US" altLang="ja-JP" sz="1600" dirty="0">
+                <a:solidFill>
+                  <a:schemeClr val="tx1">
+                    <a:lumMod val="75000"/>
+                    <a:lumOff val="25000"/>
+                  </a:schemeClr>
+                </a:solidFill>
+              </a:rPr>
+              <a:t>-dependencies</a:t>
+            </a:r>
+            <a:endParaRPr kumimoji="1" lang="en-US" altLang="ja-JP" sz="1600" dirty="0" smtClean="0">
+              <a:solidFill>
+                <a:schemeClr val="tx1">
+                  <a:lumMod val="75000"/>
+                  <a:lumOff val="25000"/>
+                </a:schemeClr>
+              </a:solidFill>
+            </a:endParaRPr>
+          </a:p>
+        </p:txBody>
+      </p:sp>
+      <p:sp>
+        <p:nvSpPr>
+          <p:cNvPr id="49" name="角丸四角形 48"/>
+          <p:cNvSpPr/>
+          <p:nvPr/>
+        </p:nvSpPr>
+        <p:spPr>
+          <a:xfrm>
+            <a:off x="3158284" y="7010967"/>
+            <a:ext cx="3353754" cy="368242"/>
+          </a:xfrm>
+          <a:prstGeom prst="roundRect">
+            <a:avLst/>
+          </a:prstGeom>
+          <a:gradFill>
+            <a:gsLst>
+              <a:gs pos="0">
+                <a:schemeClr val="bg1">
+                  <a:lumMod val="75000"/>
+                </a:schemeClr>
+              </a:gs>
+              <a:gs pos="100000">
+                <a:schemeClr val="bg1">
+                  <a:lumMod val="95000"/>
+                </a:schemeClr>
+              </a:gs>
+            </a:gsLst>
+          </a:gradFill>
+        </p:spPr>
+        <p:style>
+          <a:lnRef idx="1">
+            <a:schemeClr val="dk1"/>
+          </a:lnRef>
+          <a:fillRef idx="3">
+            <a:schemeClr val="dk1"/>
+          </a:fillRef>
+          <a:effectRef idx="2">
+            <a:schemeClr val="dk1"/>
+          </a:effectRef>
+          <a:fontRef idx="minor">
+            <a:schemeClr val="lt1"/>
+          </a:fontRef>
+        </p:style>
+        <p:txBody>
+          <a:bodyPr rtlCol="0" anchor="ctr"/>
+          <a:lstStyle/>
+          <a:p>
+            <a:pPr algn="ctr"/>
+            <a:r>
+              <a:rPr lang="en-US" altLang="ja-JP" sz="1600" dirty="0" smtClean="0">
+                <a:solidFill>
+                  <a:schemeClr val="tx1">
+                    <a:lumMod val="75000"/>
+                    <a:lumOff val="25000"/>
+                  </a:schemeClr>
+                </a:solidFill>
+              </a:rPr>
+              <a:t>recommended-web-dependencies</a:t>
+            </a:r>
+            <a:endParaRPr kumimoji="1" lang="en-US" altLang="ja-JP" sz="1600" dirty="0" smtClean="0">
+              <a:solidFill>
+                <a:schemeClr val="tx1">
+                  <a:lumMod val="75000"/>
+                  <a:lumOff val="25000"/>
+                </a:schemeClr>
+              </a:solidFill>
+            </a:endParaRPr>
+          </a:p>
+        </p:txBody>
+      </p:sp>
+      <p:sp>
+        <p:nvSpPr>
+          <p:cNvPr id="50" name="角丸四角形 49"/>
+          <p:cNvSpPr/>
+          <p:nvPr/>
+        </p:nvSpPr>
+        <p:spPr>
+          <a:xfrm>
+            <a:off x="3124700" y="5071515"/>
+            <a:ext cx="3387338" cy="368242"/>
+          </a:xfrm>
+          <a:prstGeom prst="roundRect">
+            <a:avLst/>
+          </a:prstGeom>
+          <a:gradFill>
+            <a:gsLst>
+              <a:gs pos="0">
+                <a:schemeClr val="bg1">
+                  <a:lumMod val="75000"/>
+                </a:schemeClr>
+              </a:gs>
+              <a:gs pos="100000">
+                <a:schemeClr val="bg1">
+                  <a:lumMod val="95000"/>
+                </a:schemeClr>
+              </a:gs>
+            </a:gsLst>
+          </a:gradFill>
+        </p:spPr>
+        <p:style>
+          <a:lnRef idx="1">
+            <a:schemeClr val="dk1"/>
+          </a:lnRef>
+          <a:fillRef idx="3">
+            <a:schemeClr val="dk1"/>
+          </a:fillRef>
+          <a:effectRef idx="2">
+            <a:schemeClr val="dk1"/>
+          </a:effectRef>
+          <a:fontRef idx="minor">
+            <a:schemeClr val="lt1"/>
+          </a:fontRef>
+        </p:style>
+        <p:txBody>
+          <a:bodyPr rtlCol="0" anchor="ctr"/>
+          <a:lstStyle/>
+          <a:p>
+            <a:pPr algn="ctr"/>
+            <a:r>
+              <a:rPr lang="en-US" altLang="ja-JP" sz="1600" dirty="0" smtClean="0">
+                <a:solidFill>
+                  <a:schemeClr val="tx1">
+                    <a:lumMod val="75000"/>
+                    <a:lumOff val="25000"/>
+                  </a:schemeClr>
+                </a:solidFill>
+              </a:rPr>
+              <a:t>mybatis3</a:t>
+            </a:r>
+            <a:endParaRPr kumimoji="1" lang="en-US" altLang="ja-JP" sz="1600" dirty="0" smtClean="0">
+              <a:solidFill>
+                <a:schemeClr val="tx1">
+                  <a:lumMod val="75000"/>
+                  <a:lumOff val="25000"/>
+                </a:schemeClr>
+              </a:solidFill>
+            </a:endParaRPr>
+          </a:p>
+        </p:txBody>
+      </p:sp>
+      <p:sp>
+        <p:nvSpPr>
+          <p:cNvPr id="51" name="角丸四角形 50"/>
+          <p:cNvSpPr/>
+          <p:nvPr/>
+        </p:nvSpPr>
+        <p:spPr>
+          <a:xfrm>
+            <a:off x="3138191" y="5718000"/>
+            <a:ext cx="3387338" cy="368242"/>
+          </a:xfrm>
+          <a:prstGeom prst="roundRect">
+            <a:avLst/>
+          </a:prstGeom>
+          <a:gradFill>
+            <a:gsLst>
+              <a:gs pos="0">
+                <a:schemeClr val="bg1">
+                  <a:lumMod val="75000"/>
+                </a:schemeClr>
+              </a:gs>
+              <a:gs pos="100000">
+                <a:schemeClr val="bg1">
+                  <a:lumMod val="95000"/>
+                </a:schemeClr>
+              </a:gs>
+            </a:gsLst>
+          </a:gradFill>
+        </p:spPr>
+        <p:style>
+          <a:lnRef idx="1">
+            <a:schemeClr val="dk1"/>
+          </a:lnRef>
+          <a:fillRef idx="3">
+            <a:schemeClr val="dk1"/>
+          </a:fillRef>
+          <a:effectRef idx="2">
+            <a:schemeClr val="dk1"/>
+          </a:effectRef>
+          <a:fontRef idx="minor">
+            <a:schemeClr val="lt1"/>
+          </a:fontRef>
+        </p:style>
+        <p:txBody>
+          <a:bodyPr rtlCol="0" anchor="ctr"/>
+          <a:lstStyle/>
+          <a:p>
+            <a:pPr algn="ctr"/>
+            <a:r>
+              <a:rPr kumimoji="1" lang="en-US" altLang="ja-JP" sz="1600" dirty="0" err="1" smtClean="0">
+                <a:solidFill>
+                  <a:schemeClr val="tx1">
+                    <a:lumMod val="75000"/>
+                    <a:lumOff val="25000"/>
+                  </a:schemeClr>
+                </a:solidFill>
+              </a:rPr>
+              <a:t>jpa</a:t>
+            </a:r>
+            <a:endParaRPr kumimoji="1" lang="en-US" altLang="ja-JP" sz="1600" dirty="0" smtClean="0">
+              <a:solidFill>
+                <a:schemeClr val="tx1">
+                  <a:lumMod val="75000"/>
+                  <a:lumOff val="25000"/>
+                </a:schemeClr>
+              </a:solidFill>
+            </a:endParaRPr>
+          </a:p>
+        </p:txBody>
+      </p:sp>
+      <p:sp>
+        <p:nvSpPr>
+          <p:cNvPr id="52" name="角丸四角形 51"/>
+          <p:cNvSpPr/>
+          <p:nvPr/>
+        </p:nvSpPr>
+        <p:spPr>
+          <a:xfrm>
+            <a:off x="3104855" y="1839090"/>
+            <a:ext cx="3387338" cy="368242"/>
+          </a:xfrm>
+          <a:prstGeom prst="roundRect">
+            <a:avLst/>
+          </a:prstGeom>
+          <a:gradFill>
+            <a:gsLst>
+              <a:gs pos="0">
+                <a:schemeClr val="bg1">
+                  <a:lumMod val="75000"/>
+                </a:schemeClr>
+              </a:gs>
+              <a:gs pos="100000">
+                <a:schemeClr val="bg1">
+                  <a:lumMod val="95000"/>
+                </a:schemeClr>
+              </a:gs>
+            </a:gsLst>
+          </a:gradFill>
+        </p:spPr>
+        <p:style>
+          <a:lnRef idx="1">
+            <a:schemeClr val="dk1"/>
+          </a:lnRef>
+          <a:fillRef idx="3">
+            <a:schemeClr val="dk1"/>
+          </a:fillRef>
+          <a:effectRef idx="2">
+            <a:schemeClr val="dk1"/>
+          </a:effectRef>
+          <a:fontRef idx="minor">
+            <a:schemeClr val="lt1"/>
+          </a:fontRef>
+        </p:style>
+        <p:txBody>
+          <a:bodyPr rtlCol="0" anchor="ctr"/>
+          <a:lstStyle/>
+          <a:p>
+            <a:pPr algn="ctr"/>
+            <a:r>
+              <a:rPr lang="en-US" altLang="ja-JP" sz="1600" dirty="0" smtClean="0">
+                <a:solidFill>
+                  <a:schemeClr val="tx1">
+                    <a:lumMod val="75000"/>
+                    <a:lumOff val="25000"/>
+                  </a:schemeClr>
+                </a:solidFill>
+              </a:rPr>
+              <a:t>common</a:t>
+            </a:r>
+            <a:endParaRPr kumimoji="1" lang="en-US" altLang="ja-JP" sz="1600" dirty="0" smtClean="0">
+              <a:solidFill>
+                <a:schemeClr val="tx1">
+                  <a:lumMod val="75000"/>
+                  <a:lumOff val="25000"/>
+                </a:schemeClr>
+              </a:solidFill>
+            </a:endParaRPr>
+          </a:p>
+        </p:txBody>
+      </p:sp>
+      <p:sp>
+        <p:nvSpPr>
+          <p:cNvPr id="53" name="角丸四角形 52"/>
+          <p:cNvSpPr/>
+          <p:nvPr/>
+        </p:nvSpPr>
+        <p:spPr>
+          <a:xfrm>
+            <a:off x="3114778" y="2485575"/>
+            <a:ext cx="3377415" cy="368242"/>
+          </a:xfrm>
+          <a:prstGeom prst="roundRect">
+            <a:avLst/>
+          </a:prstGeom>
+          <a:gradFill>
+            <a:gsLst>
+              <a:gs pos="0">
+                <a:schemeClr val="bg1">
+                  <a:lumMod val="75000"/>
+                </a:schemeClr>
+              </a:gs>
+              <a:gs pos="100000">
+                <a:schemeClr val="bg1">
+                  <a:lumMod val="95000"/>
+                </a:schemeClr>
+              </a:gs>
+            </a:gsLst>
+          </a:gradFill>
+        </p:spPr>
+        <p:style>
+          <a:lnRef idx="1">
+            <a:schemeClr val="dk1"/>
+          </a:lnRef>
+          <a:fillRef idx="3">
+            <a:schemeClr val="dk1"/>
+          </a:fillRef>
+          <a:effectRef idx="2">
+            <a:schemeClr val="dk1"/>
+          </a:effectRef>
+          <a:fontRef idx="minor">
+            <a:schemeClr val="lt1"/>
+          </a:fontRef>
+        </p:style>
+        <p:txBody>
+          <a:bodyPr rtlCol="0" anchor="ctr"/>
+          <a:lstStyle/>
+          <a:p>
+            <a:pPr algn="ctr"/>
+            <a:r>
+              <a:rPr kumimoji="1" lang="en-US" altLang="ja-JP" sz="1600" dirty="0" smtClean="0">
+                <a:solidFill>
+                  <a:schemeClr val="tx1">
+                    <a:lumMod val="75000"/>
+                    <a:lumOff val="25000"/>
+                  </a:schemeClr>
+                </a:solidFill>
+              </a:rPr>
+              <a:t>web</a:t>
+            </a:r>
+          </a:p>
+        </p:txBody>
+      </p:sp>
+      <p:sp>
+        <p:nvSpPr>
+          <p:cNvPr id="55" name="角丸四角形 54"/>
+          <p:cNvSpPr/>
+          <p:nvPr/>
+        </p:nvSpPr>
+        <p:spPr>
+          <a:xfrm>
+            <a:off x="3104856" y="1192605"/>
+            <a:ext cx="3387338" cy="368242"/>
+          </a:xfrm>
+          <a:prstGeom prst="roundRect">
+            <a:avLst/>
+          </a:prstGeom>
+          <a:gradFill>
+            <a:gsLst>
+              <a:gs pos="0">
+                <a:schemeClr val="bg1">
+                  <a:lumMod val="75000"/>
+                </a:schemeClr>
+              </a:gs>
+              <a:gs pos="100000">
+                <a:schemeClr val="bg1">
+                  <a:lumMod val="95000"/>
+                </a:schemeClr>
+              </a:gs>
+            </a:gsLst>
+          </a:gradFill>
+        </p:spPr>
+        <p:style>
+          <a:lnRef idx="1">
+            <a:schemeClr val="dk1"/>
+          </a:lnRef>
+          <a:fillRef idx="3">
+            <a:schemeClr val="dk1"/>
+          </a:fillRef>
+          <a:effectRef idx="2">
+            <a:schemeClr val="dk1"/>
+          </a:effectRef>
+          <a:fontRef idx="minor">
+            <a:schemeClr val="lt1"/>
+          </a:fontRef>
+        </p:style>
+        <p:txBody>
+          <a:bodyPr rtlCol="0" anchor="ctr"/>
+          <a:lstStyle/>
+          <a:p>
+            <a:pPr algn="ctr"/>
+            <a:r>
+              <a:rPr kumimoji="1" lang="en-US" altLang="ja-JP" sz="1600" dirty="0" err="1" smtClean="0">
+                <a:solidFill>
+                  <a:schemeClr val="tx1">
+                    <a:lumMod val="75000"/>
+                    <a:lumOff val="25000"/>
+                  </a:schemeClr>
+                </a:solidFill>
+              </a:rPr>
+              <a:t>jodatime</a:t>
+            </a:r>
+            <a:endParaRPr kumimoji="1" lang="en-US" altLang="ja-JP" sz="1600" dirty="0" smtClean="0">
+              <a:solidFill>
+                <a:schemeClr val="tx1">
+                  <a:lumMod val="75000"/>
+                  <a:lumOff val="25000"/>
+                </a:schemeClr>
+              </a:solidFill>
+            </a:endParaRPr>
+          </a:p>
+        </p:txBody>
+      </p:sp>
+      <p:sp>
+        <p:nvSpPr>
+          <p:cNvPr id="56" name="角丸四角形 55"/>
+          <p:cNvSpPr/>
+          <p:nvPr/>
+        </p:nvSpPr>
+        <p:spPr>
+          <a:xfrm>
+            <a:off x="234882" y="2539300"/>
+            <a:ext cx="1339676" cy="368242"/>
+          </a:xfrm>
+          <a:prstGeom prst="roundRect">
+            <a:avLst/>
+          </a:prstGeom>
+          <a:gradFill>
+            <a:gsLst>
+              <a:gs pos="0">
+                <a:schemeClr val="bg1">
+                  <a:lumMod val="75000"/>
+                </a:schemeClr>
+              </a:gs>
+              <a:gs pos="100000">
+                <a:schemeClr val="bg1">
+                  <a:lumMod val="95000"/>
+                </a:schemeClr>
+              </a:gs>
+            </a:gsLst>
+          </a:gradFill>
+        </p:spPr>
+        <p:style>
+          <a:lnRef idx="1">
+            <a:schemeClr val="dk1"/>
+          </a:lnRef>
+          <a:fillRef idx="3">
+            <a:schemeClr val="dk1"/>
+          </a:fillRef>
+          <a:effectRef idx="2">
+            <a:schemeClr val="dk1"/>
+          </a:effectRef>
+          <a:fontRef idx="minor">
+            <a:schemeClr val="lt1"/>
+          </a:fontRef>
+        </p:style>
+        <p:txBody>
+          <a:bodyPr rtlCol="0" anchor="ctr"/>
+          <a:lstStyle/>
+          <a:p>
+            <a:pPr algn="ctr"/>
+            <a:r>
+              <a:rPr kumimoji="1" lang="en-US" altLang="ja-JP" sz="1600" dirty="0" smtClean="0">
+                <a:solidFill>
+                  <a:schemeClr val="tx1">
+                    <a:lumMod val="75000"/>
+                    <a:lumOff val="25000"/>
+                  </a:schemeClr>
+                </a:solidFill>
+              </a:rPr>
+              <a:t>parent</a:t>
+            </a:r>
+          </a:p>
+        </p:txBody>
+      </p:sp>
+      <p:cxnSp>
+        <p:nvCxnSpPr>
+          <p:cNvPr id="3" name="直線コネクタ 2"/>
+          <p:cNvCxnSpPr>
+            <a:stCxn id="47" idx="2"/>
+            <a:endCxn id="46" idx="0"/>
+          </p:cNvCxnSpPr>
+          <p:nvPr/>
+        </p:nvCxnSpPr>
+        <p:spPr>
+          <a:xfrm>
+            <a:off x="4800309" y="4146787"/>
+            <a:ext cx="8138" cy="278243"/>
+          </a:xfrm>
+          <a:prstGeom prst="straightConnector1">
+            <a:avLst/>
+          </a:prstGeom>
+          <a:ln w="12700" cmpd="sng">
+            <a:solidFill>
+              <a:schemeClr val="tx1">
+                <a:lumMod val="50000"/>
+                <a:lumOff val="50000"/>
+              </a:schemeClr>
+            </a:solidFill>
+            <a:prstDash val="sysDash"/>
+            <a:headEnd type="none"/>
+            <a:tailEnd type="arrow"/>
+          </a:ln>
+        </p:spPr>
+        <p:style>
+          <a:lnRef idx="2">
+            <a:schemeClr val="accent1"/>
+          </a:lnRef>
+          <a:fillRef idx="0">
+            <a:schemeClr val="accent1"/>
+          </a:fillRef>
+          <a:effectRef idx="1">
+            <a:schemeClr val="accent1"/>
+          </a:effectRef>
+          <a:fontRef idx="minor">
+            <a:schemeClr val="tx1"/>
+          </a:fontRef>
+        </p:style>
+      </p:cxnSp>
+      <p:cxnSp>
+        <p:nvCxnSpPr>
+          <p:cNvPr id="57" name="直線コネクタ 2"/>
+          <p:cNvCxnSpPr>
+            <a:stCxn id="60" idx="0"/>
+            <a:endCxn id="53" idx="2"/>
+          </p:cNvCxnSpPr>
+          <p:nvPr/>
+        </p:nvCxnSpPr>
+        <p:spPr>
+          <a:xfrm flipV="1">
+            <a:off x="4803486" y="2853817"/>
+            <a:ext cx="0" cy="278243"/>
+          </a:xfrm>
+          <a:prstGeom prst="straightConnector1">
+            <a:avLst/>
+          </a:prstGeom>
+          <a:ln w="12700" cmpd="sng">
+            <a:solidFill>
+              <a:schemeClr val="tx1">
+                <a:lumMod val="50000"/>
+                <a:lumOff val="50000"/>
+              </a:schemeClr>
+            </a:solidFill>
+            <a:prstDash val="sysDash"/>
+            <a:headEnd type="none"/>
+            <a:tailEnd type="arrow"/>
+          </a:ln>
+        </p:spPr>
+        <p:style>
+          <a:lnRef idx="2">
+            <a:schemeClr val="accent1"/>
+          </a:lnRef>
+          <a:fillRef idx="0">
+            <a:schemeClr val="accent1"/>
+          </a:fillRef>
+          <a:effectRef idx="1">
+            <a:schemeClr val="accent1"/>
+          </a:effectRef>
+          <a:fontRef idx="minor">
+            <a:schemeClr val="tx1"/>
+          </a:fontRef>
+        </p:style>
+      </p:cxnSp>
+      <p:cxnSp>
+        <p:nvCxnSpPr>
+          <p:cNvPr id="65" name="直線コネクタ 2"/>
+          <p:cNvCxnSpPr>
+            <a:stCxn id="55" idx="2"/>
+            <a:endCxn id="52" idx="0"/>
+          </p:cNvCxnSpPr>
+          <p:nvPr/>
+        </p:nvCxnSpPr>
+        <p:spPr>
+          <a:xfrm flipH="1">
+            <a:off x="4798524" y="1560847"/>
+            <a:ext cx="1" cy="278243"/>
+          </a:xfrm>
+          <a:prstGeom prst="straightConnector1">
+            <a:avLst/>
+          </a:prstGeom>
+          <a:ln w="12700" cmpd="sng">
+            <a:solidFill>
+              <a:schemeClr val="tx1">
+                <a:lumMod val="50000"/>
+                <a:lumOff val="50000"/>
+              </a:schemeClr>
+            </a:solidFill>
+            <a:prstDash val="sysDash"/>
+            <a:headEnd type="none"/>
+            <a:tailEnd type="arrow"/>
+          </a:ln>
+        </p:spPr>
+        <p:style>
+          <a:lnRef idx="2">
+            <a:schemeClr val="accent1"/>
+          </a:lnRef>
+          <a:fillRef idx="0">
+            <a:schemeClr val="accent1"/>
+          </a:fillRef>
+          <a:effectRef idx="1">
+            <a:schemeClr val="accent1"/>
+          </a:effectRef>
+          <a:fontRef idx="minor">
+            <a:schemeClr val="tx1"/>
+          </a:fontRef>
+        </p:style>
+      </p:cxnSp>
+      <p:cxnSp>
+        <p:nvCxnSpPr>
+          <p:cNvPr id="85" name="直線コネクタ 2"/>
+          <p:cNvCxnSpPr>
+            <a:stCxn id="53" idx="0"/>
+            <a:endCxn id="52" idx="2"/>
+          </p:cNvCxnSpPr>
+          <p:nvPr/>
+        </p:nvCxnSpPr>
+        <p:spPr>
+          <a:xfrm flipH="1" flipV="1">
+            <a:off x="4798524" y="2207332"/>
+            <a:ext cx="4962" cy="278243"/>
+          </a:xfrm>
+          <a:prstGeom prst="straightConnector1">
+            <a:avLst/>
+          </a:prstGeom>
+          <a:ln w="12700" cmpd="sng">
+            <a:solidFill>
+              <a:schemeClr val="tx1">
+                <a:lumMod val="50000"/>
+                <a:lumOff val="50000"/>
+              </a:schemeClr>
+            </a:solidFill>
+            <a:prstDash val="sysDash"/>
+            <a:headEnd type="none"/>
+            <a:tailEnd type="arrow"/>
+          </a:ln>
+        </p:spPr>
+        <p:style>
+          <a:lnRef idx="2">
+            <a:schemeClr val="accent1"/>
+          </a:lnRef>
+          <a:fillRef idx="0">
+            <a:schemeClr val="accent1"/>
+          </a:fillRef>
+          <a:effectRef idx="1">
+            <a:schemeClr val="accent1"/>
+          </a:effectRef>
+          <a:fontRef idx="minor">
+            <a:schemeClr val="tx1"/>
+          </a:fontRef>
+        </p:style>
+      </p:cxnSp>
+      <p:sp>
+        <p:nvSpPr>
+          <p:cNvPr id="88" name="テキスト ボックス 87"/>
+          <p:cNvSpPr txBox="1"/>
+          <p:nvPr/>
+        </p:nvSpPr>
+        <p:spPr>
+          <a:xfrm>
+            <a:off x="4897745" y="1542952"/>
+            <a:ext cx="810851" cy="307777"/>
+          </a:xfrm>
+          <a:prstGeom prst="rect">
+            <a:avLst/>
+          </a:prstGeom>
+          <a:noFill/>
+        </p:spPr>
+        <p:txBody>
+          <a:bodyPr wrap="none" rtlCol="0">
+            <a:spAutoFit/>
+          </a:bodyPr>
+          <a:lstStyle/>
+          <a:p>
+            <a:r>
+              <a:rPr kumimoji="1" lang="en-US" altLang="ja-JP" sz="1400" dirty="0" smtClean="0">
+                <a:solidFill>
+                  <a:schemeClr val="tx1">
+                    <a:lumMod val="50000"/>
+                    <a:lumOff val="50000"/>
+                  </a:schemeClr>
+                </a:solidFill>
+              </a:rPr>
+              <a:t>depends</a:t>
+            </a:r>
+            <a:endParaRPr kumimoji="1" lang="ja-JP" altLang="en-US" sz="1400" dirty="0">
+              <a:solidFill>
+                <a:schemeClr val="tx1">
+                  <a:lumMod val="50000"/>
+                  <a:lumOff val="50000"/>
+                </a:schemeClr>
+              </a:solidFill>
+            </a:endParaRPr>
+          </a:p>
+        </p:txBody>
+      </p:sp>
+      <p:sp>
+        <p:nvSpPr>
+          <p:cNvPr id="91" name="テキスト ボックス 90"/>
+          <p:cNvSpPr txBox="1"/>
+          <p:nvPr/>
+        </p:nvSpPr>
+        <p:spPr>
+          <a:xfrm>
+            <a:off x="4897953" y="2189274"/>
+            <a:ext cx="810851" cy="307777"/>
+          </a:xfrm>
+          <a:prstGeom prst="rect">
+            <a:avLst/>
+          </a:prstGeom>
+          <a:noFill/>
+        </p:spPr>
+        <p:txBody>
+          <a:bodyPr wrap="none" rtlCol="0">
+            <a:spAutoFit/>
+          </a:bodyPr>
+          <a:lstStyle/>
+          <a:p>
+            <a:r>
+              <a:rPr kumimoji="1" lang="en-US" altLang="ja-JP" sz="1400" dirty="0" smtClean="0">
+                <a:solidFill>
+                  <a:schemeClr val="tx1">
+                    <a:lumMod val="50000"/>
+                    <a:lumOff val="50000"/>
+                  </a:schemeClr>
+                </a:solidFill>
+              </a:rPr>
+              <a:t>depends</a:t>
+            </a:r>
+            <a:endParaRPr kumimoji="1" lang="ja-JP" altLang="en-US" sz="1400" dirty="0">
+              <a:solidFill>
+                <a:schemeClr val="tx1">
+                  <a:lumMod val="50000"/>
+                  <a:lumOff val="50000"/>
+                </a:schemeClr>
+              </a:solidFill>
+            </a:endParaRPr>
+          </a:p>
+        </p:txBody>
+      </p:sp>
+      <p:sp>
+        <p:nvSpPr>
+          <p:cNvPr id="92" name="テキスト ボックス 91"/>
+          <p:cNvSpPr txBox="1"/>
+          <p:nvPr/>
+        </p:nvSpPr>
+        <p:spPr>
+          <a:xfrm>
+            <a:off x="4897745" y="2836398"/>
+            <a:ext cx="810851" cy="307777"/>
+          </a:xfrm>
+          <a:prstGeom prst="rect">
+            <a:avLst/>
+          </a:prstGeom>
+          <a:noFill/>
+        </p:spPr>
+        <p:txBody>
+          <a:bodyPr wrap="none" rtlCol="0">
+            <a:spAutoFit/>
+          </a:bodyPr>
+          <a:lstStyle/>
+          <a:p>
+            <a:r>
+              <a:rPr kumimoji="1" lang="en-US" altLang="ja-JP" sz="1400" dirty="0" smtClean="0">
+                <a:solidFill>
+                  <a:schemeClr val="tx1">
+                    <a:lumMod val="50000"/>
+                    <a:lumOff val="50000"/>
+                  </a:schemeClr>
+                </a:solidFill>
+              </a:rPr>
+              <a:t>depends</a:t>
+            </a:r>
+            <a:endParaRPr kumimoji="1" lang="ja-JP" altLang="en-US" sz="1400" dirty="0">
+              <a:solidFill>
+                <a:schemeClr val="tx1">
+                  <a:lumMod val="50000"/>
+                  <a:lumOff val="50000"/>
+                </a:schemeClr>
+              </a:solidFill>
+            </a:endParaRPr>
+          </a:p>
+        </p:txBody>
+      </p:sp>
+      <p:sp>
+        <p:nvSpPr>
+          <p:cNvPr id="93" name="テキスト ボックス 92"/>
+          <p:cNvSpPr txBox="1"/>
+          <p:nvPr/>
+        </p:nvSpPr>
+        <p:spPr>
+          <a:xfrm>
+            <a:off x="6712069" y="3467693"/>
+            <a:ext cx="810851" cy="307777"/>
+          </a:xfrm>
+          <a:prstGeom prst="rect">
+            <a:avLst/>
+          </a:prstGeom>
+          <a:noFill/>
+        </p:spPr>
+        <p:txBody>
+          <a:bodyPr wrap="none" rtlCol="0">
+            <a:spAutoFit/>
+          </a:bodyPr>
+          <a:lstStyle/>
+          <a:p>
+            <a:r>
+              <a:rPr kumimoji="1" lang="en-US" altLang="ja-JP" sz="1400" dirty="0" smtClean="0">
+                <a:solidFill>
+                  <a:schemeClr val="tx1">
+                    <a:lumMod val="50000"/>
+                    <a:lumOff val="50000"/>
+                  </a:schemeClr>
+                </a:solidFill>
+              </a:rPr>
+              <a:t>depends</a:t>
+            </a:r>
+            <a:endParaRPr kumimoji="1" lang="ja-JP" altLang="en-US" sz="1400" dirty="0">
+              <a:solidFill>
+                <a:schemeClr val="tx1">
+                  <a:lumMod val="50000"/>
+                  <a:lumOff val="50000"/>
+                </a:schemeClr>
+              </a:solidFill>
+            </a:endParaRPr>
+          </a:p>
+        </p:txBody>
+      </p:sp>
+      <p:cxnSp>
+        <p:nvCxnSpPr>
+          <p:cNvPr id="94" name="直線コネクタ 2"/>
+          <p:cNvCxnSpPr>
+            <a:stCxn id="55" idx="1"/>
+            <a:endCxn id="56" idx="3"/>
+          </p:cNvCxnSpPr>
+          <p:nvPr/>
+        </p:nvCxnSpPr>
+        <p:spPr>
+          <a:xfrm flipH="1">
+            <a:off x="1574558" y="1376726"/>
+            <a:ext cx="1530298" cy="1346695"/>
+          </a:xfrm>
+          <a:prstGeom prst="straightConnector1">
+            <a:avLst/>
+          </a:prstGeom>
+          <a:ln w="12700" cmpd="sng">
+            <a:solidFill>
+              <a:schemeClr val="tx1">
+                <a:lumMod val="50000"/>
+                <a:lumOff val="50000"/>
+              </a:schemeClr>
+            </a:solidFill>
+            <a:prstDash val="solid"/>
+            <a:headEnd type="none"/>
+            <a:tailEnd type="none"/>
+          </a:ln>
+        </p:spPr>
+        <p:style>
+          <a:lnRef idx="2">
+            <a:schemeClr val="accent1"/>
+          </a:lnRef>
+          <a:fillRef idx="0">
+            <a:schemeClr val="accent1"/>
+          </a:fillRef>
+          <a:effectRef idx="1">
+            <a:schemeClr val="accent1"/>
+          </a:effectRef>
+          <a:fontRef idx="minor">
+            <a:schemeClr val="tx1"/>
+          </a:fontRef>
+        </p:style>
+      </p:cxnSp>
+      <p:cxnSp>
+        <p:nvCxnSpPr>
+          <p:cNvPr id="96" name="直線コネクタ 2"/>
+          <p:cNvCxnSpPr>
+            <a:stCxn id="52" idx="1"/>
+            <a:endCxn id="56" idx="3"/>
+          </p:cNvCxnSpPr>
+          <p:nvPr/>
+        </p:nvCxnSpPr>
+        <p:spPr>
+          <a:xfrm flipH="1">
+            <a:off x="1574558" y="2023211"/>
+            <a:ext cx="1530297" cy="700210"/>
+          </a:xfrm>
+          <a:prstGeom prst="straightConnector1">
+            <a:avLst/>
+          </a:prstGeom>
+          <a:ln w="12700" cmpd="sng">
+            <a:solidFill>
+              <a:schemeClr val="tx1">
+                <a:lumMod val="50000"/>
+                <a:lumOff val="50000"/>
+              </a:schemeClr>
+            </a:solidFill>
+            <a:prstDash val="solid"/>
+            <a:headEnd type="none"/>
+            <a:tailEnd type="none"/>
+          </a:ln>
+        </p:spPr>
+        <p:style>
+          <a:lnRef idx="2">
+            <a:schemeClr val="accent1"/>
+          </a:lnRef>
+          <a:fillRef idx="0">
+            <a:schemeClr val="accent1"/>
+          </a:fillRef>
+          <a:effectRef idx="1">
+            <a:schemeClr val="accent1"/>
+          </a:effectRef>
+          <a:fontRef idx="minor">
+            <a:schemeClr val="tx1"/>
+          </a:fontRef>
+        </p:style>
+      </p:cxnSp>
+      <p:cxnSp>
+        <p:nvCxnSpPr>
+          <p:cNvPr id="99" name="直線コネクタ 2"/>
+          <p:cNvCxnSpPr>
+            <a:stCxn id="53" idx="1"/>
+            <a:endCxn id="56" idx="3"/>
+          </p:cNvCxnSpPr>
+          <p:nvPr/>
+        </p:nvCxnSpPr>
+        <p:spPr>
+          <a:xfrm flipH="1">
+            <a:off x="1574558" y="2669696"/>
+            <a:ext cx="1540220" cy="53725"/>
+          </a:xfrm>
+          <a:prstGeom prst="straightConnector1">
+            <a:avLst/>
+          </a:prstGeom>
+          <a:ln w="12700" cmpd="sng">
+            <a:solidFill>
+              <a:schemeClr val="tx1">
+                <a:lumMod val="50000"/>
+                <a:lumOff val="50000"/>
+              </a:schemeClr>
+            </a:solidFill>
+            <a:prstDash val="solid"/>
+            <a:headEnd type="none"/>
+            <a:tailEnd type="none"/>
+          </a:ln>
+        </p:spPr>
+        <p:style>
+          <a:lnRef idx="2">
+            <a:schemeClr val="accent1"/>
+          </a:lnRef>
+          <a:fillRef idx="0">
+            <a:schemeClr val="accent1"/>
+          </a:fillRef>
+          <a:effectRef idx="1">
+            <a:schemeClr val="accent1"/>
+          </a:effectRef>
+          <a:fontRef idx="minor">
+            <a:schemeClr val="tx1"/>
+          </a:fontRef>
+        </p:style>
+      </p:cxnSp>
+      <p:cxnSp>
+        <p:nvCxnSpPr>
+          <p:cNvPr id="102" name="直線コネクタ 2"/>
+          <p:cNvCxnSpPr>
+            <a:stCxn id="47" idx="1"/>
+            <a:endCxn id="56" idx="3"/>
+          </p:cNvCxnSpPr>
+          <p:nvPr/>
+        </p:nvCxnSpPr>
+        <p:spPr>
+          <a:xfrm flipH="1" flipV="1">
+            <a:off x="1574558" y="2723421"/>
+            <a:ext cx="1543789" cy="1239245"/>
+          </a:xfrm>
+          <a:prstGeom prst="straightConnector1">
+            <a:avLst/>
+          </a:prstGeom>
+          <a:ln w="12700" cmpd="sng">
+            <a:solidFill>
+              <a:schemeClr val="tx1">
+                <a:lumMod val="50000"/>
+                <a:lumOff val="50000"/>
+              </a:schemeClr>
+            </a:solidFill>
+            <a:prstDash val="solid"/>
+            <a:headEnd type="none"/>
+            <a:tailEnd type="none"/>
+          </a:ln>
+        </p:spPr>
+        <p:style>
+          <a:lnRef idx="2">
+            <a:schemeClr val="accent1"/>
+          </a:lnRef>
+          <a:fillRef idx="0">
+            <a:schemeClr val="accent1"/>
+          </a:fillRef>
+          <a:effectRef idx="1">
+            <a:schemeClr val="accent1"/>
+          </a:effectRef>
+          <a:fontRef idx="minor">
+            <a:schemeClr val="tx1"/>
+          </a:fontRef>
+        </p:style>
+      </p:cxnSp>
+      <p:cxnSp>
+        <p:nvCxnSpPr>
+          <p:cNvPr id="105" name="直線コネクタ 2"/>
+          <p:cNvCxnSpPr>
+            <a:stCxn id="46" idx="1"/>
+            <a:endCxn id="56" idx="3"/>
+          </p:cNvCxnSpPr>
+          <p:nvPr/>
+        </p:nvCxnSpPr>
+        <p:spPr>
+          <a:xfrm flipH="1" flipV="1">
+            <a:off x="1574558" y="2723421"/>
+            <a:ext cx="1540220" cy="1885730"/>
+          </a:xfrm>
+          <a:prstGeom prst="straightConnector1">
+            <a:avLst/>
+          </a:prstGeom>
+          <a:ln w="12700" cmpd="sng">
+            <a:solidFill>
+              <a:schemeClr val="tx1">
+                <a:lumMod val="50000"/>
+                <a:lumOff val="50000"/>
+              </a:schemeClr>
+            </a:solidFill>
+            <a:prstDash val="solid"/>
+            <a:headEnd type="none"/>
+            <a:tailEnd type="none"/>
+          </a:ln>
+        </p:spPr>
+        <p:style>
+          <a:lnRef idx="2">
+            <a:schemeClr val="accent1"/>
+          </a:lnRef>
+          <a:fillRef idx="0">
+            <a:schemeClr val="accent1"/>
+          </a:fillRef>
+          <a:effectRef idx="1">
+            <a:schemeClr val="accent1"/>
+          </a:effectRef>
+          <a:fontRef idx="minor">
+            <a:schemeClr val="tx1"/>
+          </a:fontRef>
+        </p:style>
+      </p:cxnSp>
+      <p:cxnSp>
+        <p:nvCxnSpPr>
+          <p:cNvPr id="108" name="直線コネクタ 2"/>
+          <p:cNvCxnSpPr>
+            <a:stCxn id="50" idx="1"/>
+            <a:endCxn id="56" idx="3"/>
+          </p:cNvCxnSpPr>
+          <p:nvPr/>
+        </p:nvCxnSpPr>
+        <p:spPr>
+          <a:xfrm flipH="1" flipV="1">
+            <a:off x="1574558" y="2723421"/>
+            <a:ext cx="1550142" cy="2532215"/>
+          </a:xfrm>
+          <a:prstGeom prst="straightConnector1">
+            <a:avLst/>
+          </a:prstGeom>
+          <a:ln w="12700" cmpd="sng">
+            <a:solidFill>
+              <a:schemeClr val="tx1">
+                <a:lumMod val="50000"/>
+                <a:lumOff val="50000"/>
+              </a:schemeClr>
+            </a:solidFill>
+            <a:prstDash val="solid"/>
+            <a:headEnd type="none"/>
+            <a:tailEnd type="none"/>
+          </a:ln>
+        </p:spPr>
+        <p:style>
+          <a:lnRef idx="2">
+            <a:schemeClr val="accent1"/>
+          </a:lnRef>
+          <a:fillRef idx="0">
+            <a:schemeClr val="accent1"/>
+          </a:fillRef>
+          <a:effectRef idx="1">
+            <a:schemeClr val="accent1"/>
+          </a:effectRef>
+          <a:fontRef idx="minor">
+            <a:schemeClr val="tx1"/>
+          </a:fontRef>
+        </p:style>
+      </p:cxnSp>
+      <p:cxnSp>
+        <p:nvCxnSpPr>
+          <p:cNvPr id="111" name="直線コネクタ 2"/>
+          <p:cNvCxnSpPr>
+            <a:stCxn id="51" idx="1"/>
+            <a:endCxn id="56" idx="3"/>
+          </p:cNvCxnSpPr>
+          <p:nvPr/>
+        </p:nvCxnSpPr>
+        <p:spPr>
+          <a:xfrm flipH="1" flipV="1">
+            <a:off x="1574558" y="2723421"/>
+            <a:ext cx="1563633" cy="3178700"/>
+          </a:xfrm>
+          <a:prstGeom prst="straightConnector1">
+            <a:avLst/>
+          </a:prstGeom>
+          <a:ln w="12700" cmpd="sng">
+            <a:solidFill>
+              <a:schemeClr val="tx1">
+                <a:lumMod val="50000"/>
+                <a:lumOff val="50000"/>
+              </a:schemeClr>
+            </a:solidFill>
+            <a:prstDash val="solid"/>
+            <a:headEnd type="none"/>
+            <a:tailEnd type="none"/>
+          </a:ln>
+        </p:spPr>
+        <p:style>
+          <a:lnRef idx="2">
+            <a:schemeClr val="accent1"/>
+          </a:lnRef>
+          <a:fillRef idx="0">
+            <a:schemeClr val="accent1"/>
+          </a:fillRef>
+          <a:effectRef idx="1">
+            <a:schemeClr val="accent1"/>
+          </a:effectRef>
+          <a:fontRef idx="minor">
+            <a:schemeClr val="tx1"/>
+          </a:fontRef>
+        </p:style>
+      </p:cxnSp>
+      <p:cxnSp>
+        <p:nvCxnSpPr>
+          <p:cNvPr id="115" name="直線コネクタ 2"/>
+          <p:cNvCxnSpPr>
+            <a:stCxn id="48" idx="1"/>
+            <a:endCxn id="56" idx="3"/>
+          </p:cNvCxnSpPr>
+          <p:nvPr/>
+        </p:nvCxnSpPr>
+        <p:spPr>
+          <a:xfrm flipH="1" flipV="1">
+            <a:off x="1574558" y="2723421"/>
+            <a:ext cx="1573555" cy="3825185"/>
+          </a:xfrm>
+          <a:prstGeom prst="straightConnector1">
+            <a:avLst/>
+          </a:prstGeom>
+          <a:ln w="12700" cmpd="sng">
+            <a:solidFill>
+              <a:schemeClr val="tx1">
+                <a:lumMod val="50000"/>
+                <a:lumOff val="50000"/>
+              </a:schemeClr>
+            </a:solidFill>
+            <a:prstDash val="solid"/>
+            <a:headEnd type="none"/>
+            <a:tailEnd type="none"/>
+          </a:ln>
+        </p:spPr>
+        <p:style>
+          <a:lnRef idx="2">
+            <a:schemeClr val="accent1"/>
+          </a:lnRef>
+          <a:fillRef idx="0">
+            <a:schemeClr val="accent1"/>
+          </a:fillRef>
+          <a:effectRef idx="1">
+            <a:schemeClr val="accent1"/>
+          </a:effectRef>
+          <a:fontRef idx="minor">
+            <a:schemeClr val="tx1"/>
+          </a:fontRef>
+        </p:style>
+      </p:cxnSp>
+      <p:cxnSp>
+        <p:nvCxnSpPr>
+          <p:cNvPr id="118" name="直線コネクタ 2"/>
+          <p:cNvCxnSpPr>
+            <a:stCxn id="49" idx="1"/>
+            <a:endCxn id="56" idx="3"/>
+          </p:cNvCxnSpPr>
+          <p:nvPr/>
+        </p:nvCxnSpPr>
+        <p:spPr>
+          <a:xfrm flipH="1" flipV="1">
+            <a:off x="1574558" y="2723421"/>
+            <a:ext cx="1583726" cy="4471667"/>
+          </a:xfrm>
+          <a:prstGeom prst="straightConnector1">
+            <a:avLst/>
+          </a:prstGeom>
+          <a:ln w="12700" cmpd="sng">
+            <a:solidFill>
+              <a:schemeClr val="tx1">
+                <a:lumMod val="50000"/>
+                <a:lumOff val="50000"/>
+              </a:schemeClr>
+            </a:solidFill>
+            <a:prstDash val="solid"/>
+            <a:headEnd type="none"/>
+            <a:tailEnd type="none"/>
+          </a:ln>
+        </p:spPr>
+        <p:style>
+          <a:lnRef idx="2">
+            <a:schemeClr val="accent1"/>
+          </a:lnRef>
+          <a:fillRef idx="0">
+            <a:schemeClr val="accent1"/>
+          </a:fillRef>
+          <a:effectRef idx="1">
+            <a:schemeClr val="accent1"/>
+          </a:effectRef>
+          <a:fontRef idx="minor">
+            <a:schemeClr val="tx1"/>
+          </a:fontRef>
+        </p:style>
+      </p:cxnSp>
+      <p:sp>
+        <p:nvSpPr>
+          <p:cNvPr id="121" name="テキスト ボックス 120"/>
+          <p:cNvSpPr txBox="1"/>
+          <p:nvPr/>
+        </p:nvSpPr>
+        <p:spPr>
+          <a:xfrm>
+            <a:off x="2273194" y="2374446"/>
+            <a:ext cx="671378" cy="307777"/>
+          </a:xfrm>
+          <a:prstGeom prst="rect">
+            <a:avLst/>
+          </a:prstGeom>
+          <a:noFill/>
+        </p:spPr>
+        <p:txBody>
+          <a:bodyPr wrap="none" rtlCol="0">
+            <a:spAutoFit/>
+          </a:bodyPr>
+          <a:lstStyle/>
+          <a:p>
+            <a:r>
+              <a:rPr kumimoji="1" lang="en-US" altLang="ja-JP" sz="1400" dirty="0" smtClean="0">
+                <a:solidFill>
+                  <a:schemeClr val="tx1">
+                    <a:lumMod val="50000"/>
+                    <a:lumOff val="50000"/>
+                  </a:schemeClr>
+                </a:solidFill>
+              </a:rPr>
+              <a:t>parent</a:t>
+            </a:r>
+            <a:endParaRPr kumimoji="1" lang="ja-JP" altLang="en-US" sz="1400" dirty="0">
+              <a:solidFill>
+                <a:schemeClr val="tx1">
+                  <a:lumMod val="50000"/>
+                  <a:lumOff val="50000"/>
+                </a:schemeClr>
+              </a:solidFill>
+            </a:endParaRPr>
+          </a:p>
+        </p:txBody>
+      </p:sp>
+      <p:sp>
+        <p:nvSpPr>
+          <p:cNvPr id="122" name="右中かっこ 121"/>
+          <p:cNvSpPr/>
+          <p:nvPr/>
+        </p:nvSpPr>
+        <p:spPr>
+          <a:xfrm>
+            <a:off x="7351555" y="1269846"/>
+            <a:ext cx="367100" cy="2960224"/>
+          </a:xfrm>
+          <a:prstGeom prst="rightBrace">
+            <a:avLst/>
+          </a:prstGeom>
+          <a:ln>
+            <a:solidFill>
+              <a:srgbClr val="7F7F7F"/>
+            </a:solidFill>
+          </a:ln>
+        </p:spPr>
+        <p:style>
+          <a:lnRef idx="2">
+            <a:schemeClr val="accent1"/>
+          </a:lnRef>
+          <a:fillRef idx="0">
+            <a:schemeClr val="accent1"/>
+          </a:fillRef>
+          <a:effectRef idx="1">
+            <a:schemeClr val="accent1"/>
+          </a:effectRef>
+          <a:fontRef idx="minor">
+            <a:schemeClr val="tx1"/>
+          </a:fontRef>
+        </p:style>
+        <p:txBody>
+          <a:bodyPr rtlCol="0" anchor="ctr"/>
+          <a:lstStyle/>
+          <a:p>
+            <a:pPr algn="ctr"/>
+            <a:endParaRPr kumimoji="1" lang="ja-JP" altLang="en-US"/>
+          </a:p>
+        </p:txBody>
+      </p:sp>
+      <p:sp>
+        <p:nvSpPr>
+          <p:cNvPr id="123" name="右中かっこ 122"/>
+          <p:cNvSpPr/>
+          <p:nvPr/>
+        </p:nvSpPr>
+        <p:spPr>
+          <a:xfrm>
+            <a:off x="7351555" y="4350084"/>
+            <a:ext cx="396864" cy="3013572"/>
+          </a:xfrm>
+          <a:prstGeom prst="rightBrace">
+            <a:avLst>
+              <a:gd name="adj1" fmla="val 0"/>
+              <a:gd name="adj2" fmla="val 50000"/>
+            </a:avLst>
+          </a:prstGeom>
+          <a:ln>
+            <a:solidFill>
+              <a:srgbClr val="7F7F7F"/>
+            </a:solidFill>
+          </a:ln>
+        </p:spPr>
+        <p:style>
+          <a:lnRef idx="2">
+            <a:schemeClr val="accent1"/>
+          </a:lnRef>
+          <a:fillRef idx="0">
+            <a:schemeClr val="accent1"/>
+          </a:fillRef>
+          <a:effectRef idx="1">
+            <a:schemeClr val="accent1"/>
+          </a:effectRef>
+          <a:fontRef idx="minor">
+            <a:schemeClr val="tx1"/>
+          </a:fontRef>
+        </p:style>
+        <p:txBody>
+          <a:bodyPr rtlCol="0" anchor="ctr"/>
+          <a:lstStyle/>
+          <a:p>
+            <a:pPr algn="ctr"/>
+            <a:endParaRPr kumimoji="1" lang="ja-JP" altLang="en-US"/>
+          </a:p>
+        </p:txBody>
+      </p:sp>
+      <p:sp>
+        <p:nvSpPr>
+          <p:cNvPr id="124" name="テキスト ボックス 123"/>
+          <p:cNvSpPr txBox="1"/>
+          <p:nvPr/>
+        </p:nvSpPr>
+        <p:spPr>
+          <a:xfrm>
+            <a:off x="7609513" y="2123256"/>
+            <a:ext cx="1595011" cy="1200329"/>
+          </a:xfrm>
+          <a:prstGeom prst="rect">
+            <a:avLst/>
+          </a:prstGeom>
+          <a:noFill/>
+        </p:spPr>
+        <p:txBody>
+          <a:bodyPr wrap="square" rtlCol="0">
+            <a:spAutoFit/>
+          </a:bodyPr>
+          <a:lstStyle/>
+          <a:p>
+            <a:pPr algn="ctr"/>
+            <a:r>
+              <a:rPr lang="en-US" altLang="ja-JP" dirty="0" smtClean="0">
+                <a:solidFill>
+                  <a:schemeClr val="tx1">
+                    <a:lumMod val="65000"/>
+                    <a:lumOff val="35000"/>
+                  </a:schemeClr>
+                </a:solidFill>
+              </a:rPr>
+              <a:t>Provide</a:t>
+            </a:r>
+            <a:endParaRPr kumimoji="1" lang="en-US" altLang="ja-JP" dirty="0" smtClean="0">
+              <a:solidFill>
+                <a:schemeClr val="tx1">
+                  <a:lumMod val="65000"/>
+                  <a:lumOff val="35000"/>
+                </a:schemeClr>
+              </a:solidFill>
+            </a:endParaRPr>
+          </a:p>
+          <a:p>
+            <a:pPr algn="ctr"/>
+            <a:r>
+              <a:rPr lang="en-US" altLang="ja-JP" dirty="0">
+                <a:solidFill>
+                  <a:schemeClr val="tx1">
+                    <a:lumMod val="65000"/>
+                    <a:lumOff val="35000"/>
+                  </a:schemeClr>
+                </a:solidFill>
+              </a:rPr>
+              <a:t>c</a:t>
+            </a:r>
+            <a:r>
+              <a:rPr kumimoji="1" lang="en-US" altLang="ja-JP" dirty="0" smtClean="0">
+                <a:solidFill>
+                  <a:schemeClr val="tx1">
+                    <a:lumMod val="65000"/>
+                    <a:lumOff val="35000"/>
+                  </a:schemeClr>
+                </a:solidFill>
+              </a:rPr>
+              <a:t>lasses</a:t>
+            </a:r>
+          </a:p>
+          <a:p>
+            <a:pPr algn="ctr"/>
+            <a:r>
+              <a:rPr kumimoji="1" lang="en-US" altLang="ja-JP" dirty="0" smtClean="0">
+                <a:solidFill>
+                  <a:schemeClr val="tx1">
+                    <a:lumMod val="65000"/>
+                    <a:lumOff val="35000"/>
+                  </a:schemeClr>
+                </a:solidFill>
+              </a:rPr>
+              <a:t>&amp;</a:t>
+            </a:r>
+          </a:p>
+          <a:p>
+            <a:pPr algn="ctr"/>
+            <a:r>
+              <a:rPr lang="en-US" altLang="ja-JP" dirty="0" smtClean="0">
+                <a:solidFill>
+                  <a:schemeClr val="tx1">
+                    <a:lumMod val="65000"/>
+                    <a:lumOff val="35000"/>
+                  </a:schemeClr>
+                </a:solidFill>
+              </a:rPr>
+              <a:t>dependencies</a:t>
+            </a:r>
+            <a:endParaRPr kumimoji="1" lang="ja-JP" altLang="en-US" dirty="0">
+              <a:solidFill>
+                <a:schemeClr val="tx1">
+                  <a:lumMod val="65000"/>
+                  <a:lumOff val="35000"/>
+                </a:schemeClr>
+              </a:solidFill>
+            </a:endParaRPr>
+          </a:p>
+        </p:txBody>
+      </p:sp>
+      <p:sp>
+        <p:nvSpPr>
+          <p:cNvPr id="125" name="テキスト ボックス 124"/>
+          <p:cNvSpPr txBox="1"/>
+          <p:nvPr/>
+        </p:nvSpPr>
+        <p:spPr>
+          <a:xfrm>
+            <a:off x="7711808" y="5538971"/>
+            <a:ext cx="1492716" cy="646331"/>
+          </a:xfrm>
+          <a:prstGeom prst="rect">
+            <a:avLst/>
+          </a:prstGeom>
+          <a:noFill/>
+        </p:spPr>
+        <p:txBody>
+          <a:bodyPr wrap="none" rtlCol="0">
+            <a:spAutoFit/>
+          </a:bodyPr>
+          <a:lstStyle/>
+          <a:p>
+            <a:pPr algn="ctr"/>
+            <a:r>
+              <a:rPr lang="en-US" altLang="ja-JP" dirty="0" smtClean="0">
+                <a:solidFill>
+                  <a:schemeClr val="tx1">
+                    <a:lumMod val="65000"/>
+                    <a:lumOff val="35000"/>
+                  </a:schemeClr>
+                </a:solidFill>
+              </a:rPr>
+              <a:t>Provide</a:t>
+            </a:r>
+          </a:p>
+          <a:p>
+            <a:pPr algn="ctr"/>
+            <a:r>
+              <a:rPr lang="en-US" altLang="ja-JP" dirty="0">
+                <a:solidFill>
+                  <a:schemeClr val="tx1">
+                    <a:lumMod val="65000"/>
+                    <a:lumOff val="35000"/>
+                  </a:schemeClr>
+                </a:solidFill>
+              </a:rPr>
+              <a:t>d</a:t>
+            </a:r>
+            <a:r>
+              <a:rPr lang="en-US" altLang="ja-JP" dirty="0" smtClean="0">
+                <a:solidFill>
+                  <a:schemeClr val="tx1">
+                    <a:lumMod val="65000"/>
+                    <a:lumOff val="35000"/>
+                  </a:schemeClr>
+                </a:solidFill>
+              </a:rPr>
+              <a:t>ependencies</a:t>
+            </a:r>
+            <a:endParaRPr kumimoji="1" lang="ja-JP" altLang="en-US" dirty="0">
+              <a:solidFill>
+                <a:schemeClr val="tx1">
+                  <a:lumMod val="65000"/>
+                  <a:lumOff val="35000"/>
+                </a:schemeClr>
+              </a:solidFill>
+            </a:endParaRPr>
+          </a:p>
+        </p:txBody>
+      </p:sp>
+      <p:sp>
+        <p:nvSpPr>
+          <p:cNvPr id="34" name="角丸四角形 33"/>
+          <p:cNvSpPr/>
+          <p:nvPr/>
+        </p:nvSpPr>
+        <p:spPr>
+          <a:xfrm>
+            <a:off x="3094933" y="-100365"/>
+            <a:ext cx="3387338" cy="368242"/>
+          </a:xfrm>
+          <a:prstGeom prst="roundRect">
+            <a:avLst/>
+          </a:prstGeom>
+          <a:gradFill>
+            <a:gsLst>
+              <a:gs pos="0">
+                <a:schemeClr val="bg1">
+                  <a:lumMod val="75000"/>
+                </a:schemeClr>
+              </a:gs>
+              <a:gs pos="100000">
+                <a:schemeClr val="bg1">
+                  <a:lumMod val="95000"/>
+                </a:schemeClr>
+              </a:gs>
+            </a:gsLst>
+          </a:gradFill>
+        </p:spPr>
+        <p:style>
+          <a:lnRef idx="1">
+            <a:schemeClr val="dk1"/>
+          </a:lnRef>
+          <a:fillRef idx="3">
+            <a:schemeClr val="dk1"/>
+          </a:fillRef>
+          <a:effectRef idx="2">
+            <a:schemeClr val="dk1"/>
+          </a:effectRef>
+          <a:fontRef idx="minor">
+            <a:schemeClr val="lt1"/>
+          </a:fontRef>
+        </p:style>
+        <p:txBody>
+          <a:bodyPr rtlCol="0" anchor="ctr"/>
+          <a:lstStyle/>
+          <a:p>
+            <a:pPr algn="ctr"/>
+            <a:r>
+              <a:rPr lang="en-US" altLang="ja-JP" sz="1600" dirty="0" err="1" smtClean="0">
+                <a:solidFill>
+                  <a:schemeClr val="tx1">
+                    <a:lumMod val="75000"/>
+                    <a:lumOff val="25000"/>
+                  </a:schemeClr>
+                </a:solidFill>
+              </a:rPr>
+              <a:t>codepoints</a:t>
+            </a:r>
+            <a:endParaRPr kumimoji="1" lang="en-US" altLang="ja-JP" sz="1600" dirty="0" smtClean="0">
+              <a:solidFill>
+                <a:schemeClr val="tx1">
+                  <a:lumMod val="75000"/>
+                  <a:lumOff val="25000"/>
+                </a:schemeClr>
+              </a:solidFill>
+            </a:endParaRPr>
+          </a:p>
+        </p:txBody>
+      </p:sp>
+      <p:sp>
+        <p:nvSpPr>
+          <p:cNvPr id="35" name="角丸四角形 34"/>
+          <p:cNvSpPr/>
+          <p:nvPr/>
+        </p:nvSpPr>
+        <p:spPr>
+          <a:xfrm>
+            <a:off x="3094933" y="-746850"/>
+            <a:ext cx="3387338" cy="368242"/>
+          </a:xfrm>
+          <a:prstGeom prst="roundRect">
+            <a:avLst/>
+          </a:prstGeom>
+          <a:gradFill>
+            <a:gsLst>
+              <a:gs pos="0">
+                <a:schemeClr val="bg1">
+                  <a:lumMod val="75000"/>
+                </a:schemeClr>
+              </a:gs>
+              <a:gs pos="100000">
+                <a:schemeClr val="bg1">
+                  <a:lumMod val="95000"/>
+                </a:schemeClr>
+              </a:gs>
+            </a:gsLst>
+          </a:gradFill>
+        </p:spPr>
+        <p:style>
+          <a:lnRef idx="1">
+            <a:schemeClr val="dk1"/>
+          </a:lnRef>
+          <a:fillRef idx="3">
+            <a:schemeClr val="dk1"/>
+          </a:fillRef>
+          <a:effectRef idx="2">
+            <a:schemeClr val="dk1"/>
+          </a:effectRef>
+          <a:fontRef idx="minor">
+            <a:schemeClr val="lt1"/>
+          </a:fontRef>
+        </p:style>
+        <p:txBody>
+          <a:bodyPr rtlCol="0" anchor="ctr"/>
+          <a:lstStyle/>
+          <a:p>
+            <a:pPr algn="ctr"/>
+            <a:r>
+              <a:rPr kumimoji="1" lang="en-US" altLang="ja-JP" sz="1600" dirty="0" smtClean="0">
+                <a:solidFill>
+                  <a:schemeClr val="tx1">
+                    <a:lumMod val="75000"/>
+                    <a:lumOff val="25000"/>
+                  </a:schemeClr>
+                </a:solidFill>
+              </a:rPr>
+              <a:t>string</a:t>
+            </a:r>
+          </a:p>
+        </p:txBody>
+      </p:sp>
+      <p:sp>
+        <p:nvSpPr>
+          <p:cNvPr id="36" name="角丸四角形 35"/>
+          <p:cNvSpPr/>
+          <p:nvPr/>
+        </p:nvSpPr>
+        <p:spPr>
+          <a:xfrm>
+            <a:off x="3094933" y="546120"/>
+            <a:ext cx="3387338" cy="368242"/>
+          </a:xfrm>
+          <a:prstGeom prst="roundRect">
+            <a:avLst/>
+          </a:prstGeom>
+          <a:gradFill>
+            <a:gsLst>
+              <a:gs pos="0">
+                <a:schemeClr val="bg1">
+                  <a:lumMod val="75000"/>
+                </a:schemeClr>
+              </a:gs>
+              <a:gs pos="100000">
+                <a:schemeClr val="bg1">
+                  <a:lumMod val="95000"/>
+                </a:schemeClr>
+              </a:gs>
+            </a:gsLst>
+          </a:gradFill>
+        </p:spPr>
+        <p:style>
+          <a:lnRef idx="1">
+            <a:schemeClr val="dk1"/>
+          </a:lnRef>
+          <a:fillRef idx="3">
+            <a:schemeClr val="dk1"/>
+          </a:fillRef>
+          <a:effectRef idx="2">
+            <a:schemeClr val="dk1"/>
+          </a:effectRef>
+          <a:fontRef idx="minor">
+            <a:schemeClr val="lt1"/>
+          </a:fontRef>
+        </p:style>
+        <p:txBody>
+          <a:bodyPr rtlCol="0" anchor="ctr"/>
+          <a:lstStyle/>
+          <a:p>
+            <a:pPr algn="ctr"/>
+            <a:r>
+              <a:rPr lang="en-US" altLang="ja-JP" sz="1600" dirty="0" smtClean="0">
+                <a:solidFill>
+                  <a:schemeClr val="tx1">
+                    <a:lumMod val="75000"/>
+                    <a:lumOff val="25000"/>
+                  </a:schemeClr>
+                </a:solidFill>
+              </a:rPr>
+              <a:t>validator</a:t>
+            </a:r>
+            <a:endParaRPr kumimoji="1" lang="en-US" altLang="ja-JP" sz="1600" dirty="0" smtClean="0">
+              <a:solidFill>
+                <a:schemeClr val="tx1">
+                  <a:lumMod val="75000"/>
+                  <a:lumOff val="25000"/>
+                </a:schemeClr>
+              </a:solidFill>
+            </a:endParaRPr>
+          </a:p>
+        </p:txBody>
+      </p:sp>
+      <p:cxnSp>
+        <p:nvCxnSpPr>
+          <p:cNvPr id="58" name="直線コネクタ 2"/>
+          <p:cNvCxnSpPr>
+            <a:stCxn id="36" idx="1"/>
+            <a:endCxn id="56" idx="3"/>
+          </p:cNvCxnSpPr>
+          <p:nvPr/>
+        </p:nvCxnSpPr>
+        <p:spPr>
+          <a:xfrm flipH="1">
+            <a:off x="1574558" y="730241"/>
+            <a:ext cx="1520375" cy="1993180"/>
+          </a:xfrm>
+          <a:prstGeom prst="straightConnector1">
+            <a:avLst/>
+          </a:prstGeom>
+          <a:ln w="12700" cmpd="sng">
+            <a:solidFill>
+              <a:schemeClr val="tx1">
+                <a:lumMod val="50000"/>
+                <a:lumOff val="50000"/>
+              </a:schemeClr>
+            </a:solidFill>
+            <a:prstDash val="solid"/>
+            <a:headEnd type="none"/>
+            <a:tailEnd type="none"/>
+          </a:ln>
+        </p:spPr>
+        <p:style>
+          <a:lnRef idx="2">
+            <a:schemeClr val="accent1"/>
+          </a:lnRef>
+          <a:fillRef idx="0">
+            <a:schemeClr val="accent1"/>
+          </a:fillRef>
+          <a:effectRef idx="1">
+            <a:schemeClr val="accent1"/>
+          </a:effectRef>
+          <a:fontRef idx="minor">
+            <a:schemeClr val="tx1"/>
+          </a:fontRef>
+        </p:style>
+      </p:cxnSp>
+      <p:cxnSp>
+        <p:nvCxnSpPr>
+          <p:cNvPr id="59" name="直線コネクタ 2"/>
+          <p:cNvCxnSpPr>
+            <a:stCxn id="34" idx="1"/>
+            <a:endCxn id="56" idx="3"/>
+          </p:cNvCxnSpPr>
+          <p:nvPr/>
+        </p:nvCxnSpPr>
+        <p:spPr>
+          <a:xfrm flipH="1">
+            <a:off x="1574558" y="83756"/>
+            <a:ext cx="1520375" cy="2639665"/>
+          </a:xfrm>
+          <a:prstGeom prst="straightConnector1">
+            <a:avLst/>
+          </a:prstGeom>
+          <a:ln w="12700" cmpd="sng">
+            <a:solidFill>
+              <a:schemeClr val="tx1">
+                <a:lumMod val="50000"/>
+                <a:lumOff val="50000"/>
+              </a:schemeClr>
+            </a:solidFill>
+            <a:prstDash val="solid"/>
+            <a:headEnd type="none"/>
+            <a:tailEnd type="none"/>
+          </a:ln>
+        </p:spPr>
+        <p:style>
+          <a:lnRef idx="2">
+            <a:schemeClr val="accent1"/>
+          </a:lnRef>
+          <a:fillRef idx="0">
+            <a:schemeClr val="accent1"/>
+          </a:fillRef>
+          <a:effectRef idx="1">
+            <a:schemeClr val="accent1"/>
+          </a:effectRef>
+          <a:fontRef idx="minor">
+            <a:schemeClr val="tx1"/>
+          </a:fontRef>
+        </p:style>
+      </p:cxnSp>
+      <p:cxnSp>
+        <p:nvCxnSpPr>
+          <p:cNvPr id="61" name="直線コネクタ 2"/>
+          <p:cNvCxnSpPr>
+            <a:stCxn id="35" idx="1"/>
+            <a:endCxn id="56" idx="3"/>
+          </p:cNvCxnSpPr>
+          <p:nvPr/>
+        </p:nvCxnSpPr>
+        <p:spPr>
+          <a:xfrm flipH="1">
+            <a:off x="1574558" y="-562729"/>
+            <a:ext cx="1520375" cy="3286150"/>
+          </a:xfrm>
+          <a:prstGeom prst="straightConnector1">
+            <a:avLst/>
+          </a:prstGeom>
+          <a:ln w="12700" cmpd="sng">
+            <a:solidFill>
+              <a:schemeClr val="tx1">
+                <a:lumMod val="50000"/>
+                <a:lumOff val="50000"/>
+              </a:schemeClr>
+            </a:solidFill>
+            <a:prstDash val="solid"/>
+            <a:headEnd type="none"/>
+            <a:tailEnd type="none"/>
+          </a:ln>
+        </p:spPr>
+        <p:style>
+          <a:lnRef idx="2">
+            <a:schemeClr val="accent1"/>
+          </a:lnRef>
+          <a:fillRef idx="0">
+            <a:schemeClr val="accent1"/>
+          </a:fillRef>
+          <a:effectRef idx="1">
+            <a:schemeClr val="accent1"/>
+          </a:effectRef>
+          <a:fontRef idx="minor">
+            <a:schemeClr val="tx1"/>
+          </a:fontRef>
+        </p:style>
+      </p:cxnSp>
+      <p:sp>
+        <p:nvSpPr>
+          <p:cNvPr id="64" name="右中かっこ 63"/>
+          <p:cNvSpPr/>
+          <p:nvPr/>
+        </p:nvSpPr>
+        <p:spPr>
+          <a:xfrm>
+            <a:off x="7351555" y="-920809"/>
+            <a:ext cx="367100" cy="2016000"/>
+          </a:xfrm>
+          <a:prstGeom prst="rightBrace">
+            <a:avLst/>
+          </a:prstGeom>
+          <a:ln>
+            <a:solidFill>
+              <a:srgbClr val="7F7F7F"/>
+            </a:solidFill>
+          </a:ln>
+        </p:spPr>
+        <p:style>
+          <a:lnRef idx="2">
+            <a:schemeClr val="accent1"/>
+          </a:lnRef>
+          <a:fillRef idx="0">
+            <a:schemeClr val="accent1"/>
+          </a:fillRef>
+          <a:effectRef idx="1">
+            <a:schemeClr val="accent1"/>
+          </a:effectRef>
+          <a:fontRef idx="minor">
+            <a:schemeClr val="tx1"/>
+          </a:fontRef>
+        </p:style>
+        <p:txBody>
+          <a:bodyPr rtlCol="0" anchor="ctr"/>
+          <a:lstStyle/>
+          <a:p>
+            <a:pPr algn="ctr"/>
+            <a:endParaRPr kumimoji="1" lang="ja-JP" altLang="en-US"/>
+          </a:p>
+        </p:txBody>
+      </p:sp>
+      <p:sp>
+        <p:nvSpPr>
+          <p:cNvPr id="66" name="テキスト ボックス 65"/>
+          <p:cNvSpPr txBox="1"/>
+          <p:nvPr/>
+        </p:nvSpPr>
+        <p:spPr>
+          <a:xfrm>
+            <a:off x="7718655" y="-378608"/>
+            <a:ext cx="2152047" cy="923330"/>
+          </a:xfrm>
+          <a:prstGeom prst="rect">
+            <a:avLst/>
+          </a:prstGeom>
+          <a:noFill/>
+        </p:spPr>
+        <p:txBody>
+          <a:bodyPr wrap="square" rtlCol="0">
+            <a:spAutoFit/>
+          </a:bodyPr>
+          <a:lstStyle/>
+          <a:p>
+            <a:pPr algn="ctr"/>
+            <a:r>
+              <a:rPr lang="en-US" altLang="ja-JP" dirty="0" smtClean="0">
+                <a:solidFill>
+                  <a:schemeClr val="tx1">
+                    <a:lumMod val="65000"/>
+                    <a:lumOff val="35000"/>
+                  </a:schemeClr>
+                </a:solidFill>
+              </a:rPr>
+              <a:t>Provide</a:t>
+            </a:r>
+            <a:endParaRPr kumimoji="1" lang="en-US" altLang="ja-JP" dirty="0" smtClean="0">
+              <a:solidFill>
+                <a:schemeClr val="tx1">
+                  <a:lumMod val="65000"/>
+                  <a:lumOff val="35000"/>
+                </a:schemeClr>
+              </a:solidFill>
+            </a:endParaRPr>
+          </a:p>
+          <a:p>
+            <a:pPr algn="ctr"/>
+            <a:r>
+              <a:rPr lang="en-US" altLang="ja-JP" dirty="0" smtClean="0">
+                <a:solidFill>
+                  <a:schemeClr val="tx1">
+                    <a:lumMod val="65000"/>
+                    <a:lumOff val="35000"/>
+                  </a:schemeClr>
+                </a:solidFill>
+              </a:rPr>
+              <a:t>C</a:t>
+            </a:r>
+            <a:r>
+              <a:rPr kumimoji="1" lang="en-US" altLang="ja-JP" dirty="0" smtClean="0">
+                <a:solidFill>
+                  <a:schemeClr val="tx1">
+                    <a:lumMod val="65000"/>
+                    <a:lumOff val="35000"/>
+                  </a:schemeClr>
+                </a:solidFill>
+              </a:rPr>
+              <a:t>lasses</a:t>
+            </a:r>
+            <a:endParaRPr lang="en-US" altLang="ja-JP" dirty="0">
+              <a:solidFill>
+                <a:schemeClr val="tx1">
+                  <a:lumMod val="65000"/>
+                  <a:lumOff val="35000"/>
+                </a:schemeClr>
+              </a:solidFill>
+            </a:endParaRPr>
+          </a:p>
+          <a:p>
+            <a:pPr algn="ctr"/>
+            <a:r>
+              <a:rPr lang="en-US" altLang="ja-JP" dirty="0" smtClean="0">
+                <a:solidFill>
+                  <a:schemeClr val="tx1">
+                    <a:lumMod val="65000"/>
+                    <a:lumOff val="35000"/>
+                  </a:schemeClr>
+                </a:solidFill>
+              </a:rPr>
+              <a:t>(Standalone library)</a:t>
+            </a:r>
+            <a:endParaRPr kumimoji="1" lang="ja-JP" altLang="en-US" dirty="0">
+              <a:solidFill>
+                <a:schemeClr val="tx1">
+                  <a:lumMod val="65000"/>
+                  <a:lumOff val="35000"/>
+                </a:schemeClr>
+              </a:solidFill>
+            </a:endParaRPr>
+          </a:p>
+        </p:txBody>
+      </p:sp>
+      <p:sp>
+        <p:nvSpPr>
+          <p:cNvPr id="60" name="角丸四角形 59"/>
+          <p:cNvSpPr/>
+          <p:nvPr/>
+        </p:nvSpPr>
+        <p:spPr>
+          <a:xfrm>
+            <a:off x="3114778" y="3132060"/>
+            <a:ext cx="3377415" cy="368242"/>
+          </a:xfrm>
+          <a:prstGeom prst="roundRect">
+            <a:avLst/>
+          </a:prstGeom>
+          <a:gradFill>
+            <a:gsLst>
+              <a:gs pos="0">
+                <a:schemeClr val="bg1">
+                  <a:lumMod val="75000"/>
+                </a:schemeClr>
+              </a:gs>
+              <a:gs pos="100000">
+                <a:schemeClr val="bg1">
+                  <a:lumMod val="95000"/>
+                </a:schemeClr>
+              </a:gs>
+            </a:gsLst>
+          </a:gradFill>
+        </p:spPr>
+        <p:style>
+          <a:lnRef idx="1">
+            <a:schemeClr val="dk1"/>
+          </a:lnRef>
+          <a:fillRef idx="3">
+            <a:schemeClr val="dk1"/>
+          </a:fillRef>
+          <a:effectRef idx="2">
+            <a:schemeClr val="dk1"/>
+          </a:effectRef>
+          <a:fontRef idx="minor">
+            <a:schemeClr val="lt1"/>
+          </a:fontRef>
+        </p:style>
+        <p:txBody>
+          <a:bodyPr rtlCol="0" anchor="ctr"/>
+          <a:lstStyle/>
+          <a:p>
+            <a:pPr algn="ctr"/>
+            <a:r>
+              <a:rPr kumimoji="1" lang="en-US" altLang="ja-JP" sz="1600" dirty="0" smtClean="0">
+                <a:solidFill>
+                  <a:schemeClr val="tx1">
+                    <a:lumMod val="75000"/>
+                    <a:lumOff val="25000"/>
+                  </a:schemeClr>
+                </a:solidFill>
+              </a:rPr>
+              <a:t>web</a:t>
+            </a:r>
+            <a:r>
+              <a:rPr lang="en-US" altLang="ja-JP" sz="1600" dirty="0" smtClean="0">
+                <a:solidFill>
+                  <a:schemeClr val="tx1">
+                    <a:lumMod val="75000"/>
+                    <a:lumOff val="25000"/>
+                  </a:schemeClr>
+                </a:solidFill>
+              </a:rPr>
+              <a:t>-</a:t>
+            </a:r>
+            <a:r>
+              <a:rPr lang="en-US" altLang="ja-JP" sz="1600" dirty="0" err="1" smtClean="0">
+                <a:solidFill>
+                  <a:schemeClr val="tx1">
+                    <a:lumMod val="75000"/>
+                    <a:lumOff val="25000"/>
+                  </a:schemeClr>
+                </a:solidFill>
+              </a:rPr>
+              <a:t>jsp</a:t>
+            </a:r>
+            <a:endParaRPr kumimoji="1" lang="en-US" altLang="ja-JP" sz="1600" dirty="0" smtClean="0">
+              <a:solidFill>
+                <a:schemeClr val="tx1">
+                  <a:lumMod val="75000"/>
+                  <a:lumOff val="25000"/>
+                </a:schemeClr>
+              </a:solidFill>
+            </a:endParaRPr>
+          </a:p>
+        </p:txBody>
+      </p:sp>
+      <p:sp>
+        <p:nvSpPr>
+          <p:cNvPr id="69" name="テキスト ボックス 68"/>
+          <p:cNvSpPr txBox="1"/>
+          <p:nvPr/>
+        </p:nvSpPr>
+        <p:spPr>
+          <a:xfrm>
+            <a:off x="4906044" y="4130687"/>
+            <a:ext cx="810851" cy="307777"/>
+          </a:xfrm>
+          <a:prstGeom prst="rect">
+            <a:avLst/>
+          </a:prstGeom>
+          <a:noFill/>
+        </p:spPr>
+        <p:txBody>
+          <a:bodyPr wrap="none" rtlCol="0">
+            <a:spAutoFit/>
+          </a:bodyPr>
+          <a:lstStyle/>
+          <a:p>
+            <a:r>
+              <a:rPr kumimoji="1" lang="en-US" altLang="ja-JP" sz="1400" dirty="0" smtClean="0">
+                <a:solidFill>
+                  <a:schemeClr val="tx1">
+                    <a:lumMod val="50000"/>
+                    <a:lumOff val="50000"/>
+                  </a:schemeClr>
+                </a:solidFill>
+              </a:rPr>
+              <a:t>depends</a:t>
+            </a:r>
+            <a:endParaRPr kumimoji="1" lang="ja-JP" altLang="en-US" sz="1400" dirty="0">
+              <a:solidFill>
+                <a:schemeClr val="tx1">
+                  <a:lumMod val="50000"/>
+                  <a:lumOff val="50000"/>
+                </a:schemeClr>
+              </a:solidFill>
+            </a:endParaRPr>
+          </a:p>
+        </p:txBody>
+      </p:sp>
+      <p:cxnSp>
+        <p:nvCxnSpPr>
+          <p:cNvPr id="21" name="カギ線コネクタ 20"/>
+          <p:cNvCxnSpPr>
+            <a:stCxn id="47" idx="3"/>
+            <a:endCxn id="53" idx="3"/>
+          </p:cNvCxnSpPr>
+          <p:nvPr/>
+        </p:nvCxnSpPr>
+        <p:spPr>
+          <a:xfrm flipV="1">
+            <a:off x="6482271" y="2669696"/>
+            <a:ext cx="9922" cy="1292970"/>
+          </a:xfrm>
+          <a:prstGeom prst="bentConnector3">
+            <a:avLst>
+              <a:gd name="adj1" fmla="val 2403971"/>
+            </a:avLst>
+          </a:prstGeom>
+          <a:ln w="12700" cmpd="sng">
+            <a:solidFill>
+              <a:schemeClr val="tx1">
+                <a:lumMod val="50000"/>
+                <a:lumOff val="50000"/>
+              </a:schemeClr>
+            </a:solidFill>
+            <a:prstDash val="sysDash"/>
+            <a:headEnd type="none"/>
+            <a:tailEnd type="triangle"/>
+          </a:ln>
+        </p:spPr>
+        <p:style>
+          <a:lnRef idx="2">
+            <a:schemeClr val="accent1"/>
+          </a:lnRef>
+          <a:fillRef idx="0">
+            <a:schemeClr val="accent1"/>
+          </a:fillRef>
+          <a:effectRef idx="1">
+            <a:schemeClr val="accent1"/>
+          </a:effectRef>
+          <a:fontRef idx="minor">
+            <a:schemeClr val="tx1"/>
+          </a:fontRef>
+        </p:style>
+      </p:cxnSp>
+      <p:cxnSp>
+        <p:nvCxnSpPr>
+          <p:cNvPr id="45" name="直線コネクタ 2"/>
+          <p:cNvCxnSpPr>
+            <a:stCxn id="60" idx="1"/>
+            <a:endCxn id="56" idx="3"/>
+          </p:cNvCxnSpPr>
+          <p:nvPr/>
+        </p:nvCxnSpPr>
+        <p:spPr>
+          <a:xfrm flipH="1" flipV="1">
+            <a:off x="1574558" y="2723421"/>
+            <a:ext cx="1540220" cy="592760"/>
+          </a:xfrm>
+          <a:prstGeom prst="straightConnector1">
+            <a:avLst/>
+          </a:prstGeom>
+          <a:ln w="12700" cmpd="sng">
+            <a:solidFill>
+              <a:schemeClr val="tx1">
+                <a:lumMod val="50000"/>
+                <a:lumOff val="50000"/>
+              </a:schemeClr>
+            </a:solidFill>
+            <a:prstDash val="solid"/>
+            <a:headEnd type="none"/>
+            <a:tailEnd type="none"/>
+          </a:ln>
+        </p:spPr>
+        <p:style>
+          <a:lnRef idx="2">
+            <a:schemeClr val="accent1"/>
+          </a:lnRef>
+          <a:fillRef idx="0">
+            <a:schemeClr val="accent1"/>
+          </a:fillRef>
+          <a:effectRef idx="1">
+            <a:schemeClr val="accent1"/>
+          </a:effectRef>
+          <a:fontRef idx="minor">
+            <a:schemeClr val="tx1"/>
+          </a:fontRef>
+        </p:style>
+      </p:cxnSp>
+    </p:spTree>
+    <p:extLst>
+      <p:ext uri="{BB962C8B-B14F-4D97-AF65-F5344CB8AC3E}">
+        <p14:creationId xmlns:p14="http://schemas.microsoft.com/office/powerpoint/2010/main" val="399619677"/>
       </p:ext>
     </p:extLst>
   </p:cSld>
@@ -6961,7 +9574,19 @@
       </a:style>
     </a:spDef>
     <a:lnDef>
-      <a:spPr/>
+      <a:spPr>
+        <a:ln w="12700" cmpd="sng">
+          <a:solidFill>
+            <a:schemeClr val="tx1">
+              <a:lumMod val="50000"/>
+              <a:lumOff val="50000"/>
+            </a:schemeClr>
+          </a:solidFill>
+          <a:prstDash val="sysDash"/>
+          <a:headEnd type="none"/>
+          <a:tailEnd type="arrow"/>
+        </a:ln>
+      </a:spPr>
       <a:bodyPr/>
       <a:lstStyle/>
       <a:style>

</xml_diff>